<commit_message>
fix ppt : add CTblending
</commit_message>
<xml_diff>
--- a/presentation/16+CICC1215+虹ヶ咲学园芯片设计同好会.pptx
+++ b/presentation/16+CICC1215+虹ヶ咲学园芯片设计同好会.pptx
@@ -173,7 +173,7 @@
 <file path=ppt/revisionInfo.xml><?xml version="1.0" encoding="utf-8"?>
 <p1510:revInfo xmlns:a="http://schemas.openxmlformats.org/drawingml/2006/main" xmlns:r="http://schemas.openxmlformats.org/officeDocument/2006/relationships" xmlns:p1510="http://schemas.microsoft.com/office/powerpoint/2015/10/main">
   <p1510:revLst>
-    <p1510:client id="{5740E8AC-4CB3-4DE3-A091-DD598B1C4452}" v="54" dt="2022-08-18T05:36:51.879"/>
+    <p1510:client id="{B4273F7F-E2E6-49CE-A587-97CB19801939}" v="12" dt="2022-08-19T05:04:18.633"/>
   </p1510:revLst>
 </p1510:revInfo>
 </file>
@@ -249,6 +249,205 @@
             <ac:graphicFrameMk id="21" creationId="{E9A2868E-7173-9018-E27D-4F16532EAD19}"/>
           </ac:graphicFrameMkLst>
         </pc:graphicFrameChg>
+      </pc:sldChg>
+    </pc:docChg>
+  </pc:docChgLst>
+  <pc:docChgLst>
+    <pc:chgData name="林 明锋" userId="df5b4b9bac279175" providerId="LiveId" clId="{B4273F7F-E2E6-49CE-A587-97CB19801939}"/>
+    <pc:docChg chg="undo custSel modSld">
+      <pc:chgData name="林 明锋" userId="df5b4b9bac279175" providerId="LiveId" clId="{B4273F7F-E2E6-49CE-A587-97CB19801939}" dt="2022-08-19T06:07:32.876" v="737" actId="1076"/>
+      <pc:docMkLst>
+        <pc:docMk/>
+      </pc:docMkLst>
+      <pc:sldChg chg="addSp delSp modSp mod">
+        <pc:chgData name="林 明锋" userId="df5b4b9bac279175" providerId="LiveId" clId="{B4273F7F-E2E6-49CE-A587-97CB19801939}" dt="2022-08-19T04:33:55.675" v="205" actId="108"/>
+        <pc:sldMkLst>
+          <pc:docMk/>
+          <pc:sldMk cId="1780495731" sldId="432"/>
+        </pc:sldMkLst>
+        <pc:spChg chg="mod">
+          <ac:chgData name="林 明锋" userId="df5b4b9bac279175" providerId="LiveId" clId="{B4273F7F-E2E6-49CE-A587-97CB19801939}" dt="2022-08-19T04:21:01.666" v="3" actId="1076"/>
+          <ac:spMkLst>
+            <pc:docMk/>
+            <pc:sldMk cId="1780495731" sldId="432"/>
+            <ac:spMk id="3" creationId="{00000000-0000-0000-0000-000000000000}"/>
+          </ac:spMkLst>
+        </pc:spChg>
+        <pc:spChg chg="mod">
+          <ac:chgData name="林 明锋" userId="df5b4b9bac279175" providerId="LiveId" clId="{B4273F7F-E2E6-49CE-A587-97CB19801939}" dt="2022-08-19T04:21:14.148" v="6" actId="1076"/>
+          <ac:spMkLst>
+            <pc:docMk/>
+            <pc:sldMk cId="1780495731" sldId="432"/>
+            <ac:spMk id="5" creationId="{D2D4B3FA-45F5-CEE9-19CB-CEA470F78D8C}"/>
+          </ac:spMkLst>
+        </pc:spChg>
+        <pc:spChg chg="add del mod">
+          <ac:chgData name="林 明锋" userId="df5b4b9bac279175" providerId="LiveId" clId="{B4273F7F-E2E6-49CE-A587-97CB19801939}" dt="2022-08-19T04:20:35.176" v="2"/>
+          <ac:spMkLst>
+            <pc:docMk/>
+            <pc:sldMk cId="1780495731" sldId="432"/>
+            <ac:spMk id="8" creationId="{7B491872-0DBC-DCAD-B9BD-91A3F92CCD85}"/>
+          </ac:spMkLst>
+        </pc:spChg>
+        <pc:spChg chg="mod">
+          <ac:chgData name="林 明锋" userId="df5b4b9bac279175" providerId="LiveId" clId="{B4273F7F-E2E6-49CE-A587-97CB19801939}" dt="2022-08-19T04:21:09.491" v="5" actId="1076"/>
+          <ac:spMkLst>
+            <pc:docMk/>
+            <pc:sldMk cId="1780495731" sldId="432"/>
+            <ac:spMk id="24" creationId="{BA7FA766-0FB2-4578-A085-65B4D6CB3978}"/>
+          </ac:spMkLst>
+        </pc:spChg>
+        <pc:graphicFrameChg chg="add del mod">
+          <ac:chgData name="林 明锋" userId="df5b4b9bac279175" providerId="LiveId" clId="{B4273F7F-E2E6-49CE-A587-97CB19801939}" dt="2022-08-19T04:20:35.176" v="2"/>
+          <ac:graphicFrameMkLst>
+            <pc:docMk/>
+            <pc:sldMk cId="1780495731" sldId="432"/>
+            <ac:graphicFrameMk id="4" creationId="{CC822ABF-33E9-D56E-3B78-6F763A760EC0}"/>
+          </ac:graphicFrameMkLst>
+        </pc:graphicFrameChg>
+        <pc:graphicFrameChg chg="mod modGraphic">
+          <ac:chgData name="林 明锋" userId="df5b4b9bac279175" providerId="LiveId" clId="{B4273F7F-E2E6-49CE-A587-97CB19801939}" dt="2022-08-19T04:33:55.675" v="205" actId="108"/>
+          <ac:graphicFrameMkLst>
+            <pc:docMk/>
+            <pc:sldMk cId="1780495731" sldId="432"/>
+            <ac:graphicFrameMk id="7" creationId="{A00E5D4A-22DF-4B44-8AFA-35F3EC856454}"/>
+          </ac:graphicFrameMkLst>
+        </pc:graphicFrameChg>
+        <pc:graphicFrameChg chg="add mod modGraphic">
+          <ac:chgData name="林 明锋" userId="df5b4b9bac279175" providerId="LiveId" clId="{B4273F7F-E2E6-49CE-A587-97CB19801939}" dt="2022-08-19T04:31:07.472" v="171" actId="242"/>
+          <ac:graphicFrameMkLst>
+            <pc:docMk/>
+            <pc:sldMk cId="1780495731" sldId="432"/>
+            <ac:graphicFrameMk id="9" creationId="{4AD257B0-A8C7-03A4-1CDB-984B9A680404}"/>
+          </ac:graphicFrameMkLst>
+        </pc:graphicFrameChg>
+        <pc:graphicFrameChg chg="del">
+          <ac:chgData name="林 明锋" userId="df5b4b9bac279175" providerId="LiveId" clId="{B4273F7F-E2E6-49CE-A587-97CB19801939}" dt="2022-08-19T04:20:13.307" v="0" actId="478"/>
+          <ac:graphicFrameMkLst>
+            <pc:docMk/>
+            <pc:sldMk cId="1780495731" sldId="432"/>
+            <ac:graphicFrameMk id="21" creationId="{E9A2868E-7173-9018-E27D-4F16532EAD19}"/>
+          </ac:graphicFrameMkLst>
+        </pc:graphicFrameChg>
+      </pc:sldChg>
+      <pc:sldChg chg="addSp delSp modSp mod">
+        <pc:chgData name="林 明锋" userId="df5b4b9bac279175" providerId="LiveId" clId="{B4273F7F-E2E6-49CE-A587-97CB19801939}" dt="2022-08-19T06:07:32.876" v="737" actId="1076"/>
+        <pc:sldMkLst>
+          <pc:docMk/>
+          <pc:sldMk cId="1054190846" sldId="439"/>
+        </pc:sldMkLst>
+        <pc:spChg chg="add mod">
+          <ac:chgData name="林 明锋" userId="df5b4b9bac279175" providerId="LiveId" clId="{B4273F7F-E2E6-49CE-A587-97CB19801939}" dt="2022-08-19T06:05:57.682" v="735" actId="1076"/>
+          <ac:spMkLst>
+            <pc:docMk/>
+            <pc:sldMk cId="1054190846" sldId="439"/>
+            <ac:spMk id="3" creationId="{1C1F561C-65A9-9281-0843-883530DAAEE1}"/>
+          </ac:spMkLst>
+        </pc:spChg>
+        <pc:spChg chg="add del">
+          <ac:chgData name="林 明锋" userId="df5b4b9bac279175" providerId="LiveId" clId="{B4273F7F-E2E6-49CE-A587-97CB19801939}" dt="2022-08-19T05:03:34.446" v="529" actId="22"/>
+          <ac:spMkLst>
+            <pc:docMk/>
+            <pc:sldMk cId="1054190846" sldId="439"/>
+            <ac:spMk id="6" creationId="{01BCFA58-3239-2BD7-4CD2-5622982BB168}"/>
+          </ac:spMkLst>
+        </pc:spChg>
+        <pc:spChg chg="del">
+          <ac:chgData name="林 明锋" userId="df5b4b9bac279175" providerId="LiveId" clId="{B4273F7F-E2E6-49CE-A587-97CB19801939}" dt="2022-08-19T04:53:16.837" v="213" actId="478"/>
+          <ac:spMkLst>
+            <pc:docMk/>
+            <pc:sldMk cId="1054190846" sldId="439"/>
+            <ac:spMk id="32" creationId="{7A85AA2F-4407-8582-B38F-3A50F03DDAAE}"/>
+          </ac:spMkLst>
+        </pc:spChg>
+        <pc:spChg chg="del">
+          <ac:chgData name="林 明锋" userId="df5b4b9bac279175" providerId="LiveId" clId="{B4273F7F-E2E6-49CE-A587-97CB19801939}" dt="2022-08-19T04:53:16.837" v="213" actId="478"/>
+          <ac:spMkLst>
+            <pc:docMk/>
+            <pc:sldMk cId="1054190846" sldId="439"/>
+            <ac:spMk id="33" creationId="{3CFA0E17-8E39-0C61-C415-FFF3733A2CE8}"/>
+          </ac:spMkLst>
+        </pc:spChg>
+        <pc:spChg chg="del">
+          <ac:chgData name="林 明锋" userId="df5b4b9bac279175" providerId="LiveId" clId="{B4273F7F-E2E6-49CE-A587-97CB19801939}" dt="2022-08-19T04:53:16.837" v="213" actId="478"/>
+          <ac:spMkLst>
+            <pc:docMk/>
+            <pc:sldMk cId="1054190846" sldId="439"/>
+            <ac:spMk id="35" creationId="{51060BB6-2595-AA96-598F-CA2356D70956}"/>
+          </ac:spMkLst>
+        </pc:spChg>
+        <pc:spChg chg="del">
+          <ac:chgData name="林 明锋" userId="df5b4b9bac279175" providerId="LiveId" clId="{B4273F7F-E2E6-49CE-A587-97CB19801939}" dt="2022-08-19T04:53:16.837" v="213" actId="478"/>
+          <ac:spMkLst>
+            <pc:docMk/>
+            <pc:sldMk cId="1054190846" sldId="439"/>
+            <ac:spMk id="36" creationId="{350C5BB4-1771-009B-2C0C-852442D99B2D}"/>
+          </ac:spMkLst>
+        </pc:spChg>
+        <pc:spChg chg="del">
+          <ac:chgData name="林 明锋" userId="df5b4b9bac279175" providerId="LiveId" clId="{B4273F7F-E2E6-49CE-A587-97CB19801939}" dt="2022-08-19T04:53:16.837" v="213" actId="478"/>
+          <ac:spMkLst>
+            <pc:docMk/>
+            <pc:sldMk cId="1054190846" sldId="439"/>
+            <ac:spMk id="39" creationId="{495C86B6-AC9D-81B2-F2A5-89EE664ADCA0}"/>
+          </ac:spMkLst>
+        </pc:spChg>
+        <pc:spChg chg="del">
+          <ac:chgData name="林 明锋" userId="df5b4b9bac279175" providerId="LiveId" clId="{B4273F7F-E2E6-49CE-A587-97CB19801939}" dt="2022-08-19T04:53:16.837" v="213" actId="478"/>
+          <ac:spMkLst>
+            <pc:docMk/>
+            <pc:sldMk cId="1054190846" sldId="439"/>
+            <ac:spMk id="41" creationId="{B7F0C496-006B-0470-B6A9-99EF3A625107}"/>
+          </ac:spMkLst>
+        </pc:spChg>
+        <pc:picChg chg="mod">
+          <ac:chgData name="林 明锋" userId="df5b4b9bac279175" providerId="LiveId" clId="{B4273F7F-E2E6-49CE-A587-97CB19801939}" dt="2022-08-19T05:08:31.238" v="697" actId="1076"/>
+          <ac:picMkLst>
+            <pc:docMk/>
+            <pc:sldMk cId="1054190846" sldId="439"/>
+            <ac:picMk id="5" creationId="{87C81127-9A1D-E260-3403-4A348126512F}"/>
+          </ac:picMkLst>
+        </pc:picChg>
+        <pc:picChg chg="add mod">
+          <ac:chgData name="林 明锋" userId="df5b4b9bac279175" providerId="LiveId" clId="{B4273F7F-E2E6-49CE-A587-97CB19801939}" dt="2022-08-19T06:07:32.876" v="737" actId="1076"/>
+          <ac:picMkLst>
+            <pc:docMk/>
+            <pc:sldMk cId="1054190846" sldId="439"/>
+            <ac:picMk id="8" creationId="{E383CB73-B86E-24C3-7319-FD9384E0506D}"/>
+          </ac:picMkLst>
+        </pc:picChg>
+        <pc:cxnChg chg="del mod">
+          <ac:chgData name="林 明锋" userId="df5b4b9bac279175" providerId="LiveId" clId="{B4273F7F-E2E6-49CE-A587-97CB19801939}" dt="2022-08-19T04:53:16.837" v="213" actId="478"/>
+          <ac:cxnSpMkLst>
+            <pc:docMk/>
+            <pc:sldMk cId="1054190846" sldId="439"/>
+            <ac:cxnSpMk id="34" creationId="{EE64C11F-F372-02ED-79F4-3BFCA6157748}"/>
+          </ac:cxnSpMkLst>
+        </pc:cxnChg>
+        <pc:cxnChg chg="del mod">
+          <ac:chgData name="林 明锋" userId="df5b4b9bac279175" providerId="LiveId" clId="{B4273F7F-E2E6-49CE-A587-97CB19801939}" dt="2022-08-19T04:53:16.837" v="213" actId="478"/>
+          <ac:cxnSpMkLst>
+            <pc:docMk/>
+            <pc:sldMk cId="1054190846" sldId="439"/>
+            <ac:cxnSpMk id="37" creationId="{C5A58357-3E4F-07E5-D9E1-92F984227C8E}"/>
+          </ac:cxnSpMkLst>
+        </pc:cxnChg>
+        <pc:cxnChg chg="del mod">
+          <ac:chgData name="林 明锋" userId="df5b4b9bac279175" providerId="LiveId" clId="{B4273F7F-E2E6-49CE-A587-97CB19801939}" dt="2022-08-19T04:53:16.837" v="213" actId="478"/>
+          <ac:cxnSpMkLst>
+            <pc:docMk/>
+            <pc:sldMk cId="1054190846" sldId="439"/>
+            <ac:cxnSpMk id="38" creationId="{F6CAA837-5C51-6E3F-ECC7-3CCB4390A85E}"/>
+          </ac:cxnSpMkLst>
+        </pc:cxnChg>
+        <pc:cxnChg chg="del mod">
+          <ac:chgData name="林 明锋" userId="df5b4b9bac279175" providerId="LiveId" clId="{B4273F7F-E2E6-49CE-A587-97CB19801939}" dt="2022-08-19T04:53:16.837" v="213" actId="478"/>
+          <ac:cxnSpMkLst>
+            <pc:docMk/>
+            <pc:sldMk cId="1054190846" sldId="439"/>
+            <ac:cxnSpMk id="40" creationId="{E78D1E68-397E-2739-B9FE-C12BA97CA781}"/>
+          </ac:cxnSpMkLst>
+        </pc:cxnChg>
       </pc:sldChg>
     </pc:docChg>
   </pc:docChgLst>
@@ -1135,7 +1334,7 @@
           <a:p>
             <a:fld id="{D4C5657C-E099-457B-9105-A54A42793778}" type="datetime1">
               <a:rPr lang="en-US" altLang="zh-CN" smtClean="0"/>
-              <a:t>8/18/2022</a:t>
+              <a:t>8/19/2022</a:t>
             </a:fld>
             <a:endParaRPr lang="zh-CN" altLang="en-US"/>
           </a:p>
@@ -1304,7 +1503,7 @@
           <a:p>
             <a:fld id="{5CFE5239-F2DD-4C97-9EBF-58CA499DB2A3}" type="datetime1">
               <a:rPr lang="en-US" altLang="zh-CN" smtClean="0"/>
-              <a:t>8/18/2022</a:t>
+              <a:t>8/19/2022</a:t>
             </a:fld>
             <a:endParaRPr lang="en-US"/>
           </a:p>
@@ -5017,7 +5216,7 @@
           <a:p>
             <a:fld id="{C764DE79-268F-4C1A-8933-263129D2AF90}" type="datetimeFigureOut">
               <a:rPr lang="en-US" smtClean="0"/>
-              <a:t>8/18/2022</a:t>
+              <a:t>8/19/2022</a:t>
             </a:fld>
             <a:endParaRPr lang="en-US" dirty="0"/>
           </a:p>
@@ -5200,7 +5399,7 @@
           <a:p>
             <a:fld id="{C764DE79-268F-4C1A-8933-263129D2AF90}" type="datetimeFigureOut">
               <a:rPr lang="en-US" smtClean="0"/>
-              <a:t>8/18/2022</a:t>
+              <a:t>8/19/2022</a:t>
             </a:fld>
             <a:endParaRPr lang="en-US" dirty="0"/>
           </a:p>
@@ -5393,7 +5592,7 @@
           <a:p>
             <a:fld id="{C764DE79-268F-4C1A-8933-263129D2AF90}" type="datetimeFigureOut">
               <a:rPr lang="en-US" smtClean="0"/>
-              <a:t>8/18/2022</a:t>
+              <a:t>8/19/2022</a:t>
             </a:fld>
             <a:endParaRPr lang="en-US" dirty="0"/>
           </a:p>
@@ -6005,7 +6204,7 @@
           <a:p>
             <a:fld id="{C764DE79-268F-4C1A-8933-263129D2AF90}" type="datetimeFigureOut">
               <a:rPr lang="en-US" smtClean="0"/>
-              <a:t>8/18/2022</a:t>
+              <a:t>8/19/2022</a:t>
             </a:fld>
             <a:endParaRPr lang="en-US" dirty="0"/>
           </a:p>
@@ -6250,7 +6449,7 @@
           <a:p>
             <a:fld id="{C764DE79-268F-4C1A-8933-263129D2AF90}" type="datetimeFigureOut">
               <a:rPr lang="en-US" smtClean="0"/>
-              <a:t>8/18/2022</a:t>
+              <a:t>8/19/2022</a:t>
             </a:fld>
             <a:endParaRPr lang="en-US" dirty="0"/>
           </a:p>
@@ -6630,7 +6829,7 @@
           <a:p>
             <a:fld id="{C764DE79-268F-4C1A-8933-263129D2AF90}" type="datetimeFigureOut">
               <a:rPr lang="en-US" smtClean="0"/>
-              <a:t>8/18/2022</a:t>
+              <a:t>8/19/2022</a:t>
             </a:fld>
             <a:endParaRPr lang="en-US" dirty="0"/>
           </a:p>
@@ -6761,7 +6960,7 @@
           <a:p>
             <a:fld id="{C764DE79-268F-4C1A-8933-263129D2AF90}" type="datetimeFigureOut">
               <a:rPr lang="en-US" smtClean="0"/>
-              <a:t>8/18/2022</a:t>
+              <a:t>8/19/2022</a:t>
             </a:fld>
             <a:endParaRPr lang="en-US" dirty="0"/>
           </a:p>
@@ -6869,7 +7068,7 @@
           <a:p>
             <a:fld id="{C764DE79-268F-4C1A-8933-263129D2AF90}" type="datetimeFigureOut">
               <a:rPr lang="en-US" smtClean="0"/>
-              <a:t>8/18/2022</a:t>
+              <a:t>8/19/2022</a:t>
             </a:fld>
             <a:endParaRPr lang="en-US" dirty="0"/>
           </a:p>
@@ -7159,7 +7358,7 @@
           <a:p>
             <a:fld id="{C764DE79-268F-4C1A-8933-263129D2AF90}" type="datetimeFigureOut">
               <a:rPr lang="en-US" smtClean="0"/>
-              <a:t>8/18/2022</a:t>
+              <a:t>8/19/2022</a:t>
             </a:fld>
             <a:endParaRPr lang="en-US" dirty="0"/>
           </a:p>
@@ -7429,7 +7628,7 @@
           <a:p>
             <a:fld id="{C764DE79-268F-4C1A-8933-263129D2AF90}" type="datetimeFigureOut">
               <a:rPr lang="en-US" smtClean="0"/>
-              <a:t>8/18/2022</a:t>
+              <a:t>8/19/2022</a:t>
             </a:fld>
             <a:endParaRPr lang="en-US" dirty="0"/>
           </a:p>
@@ -7660,7 +7859,7 @@
           <a:p>
             <a:fld id="{C764DE79-268F-4C1A-8933-263129D2AF90}" type="datetimeFigureOut">
               <a:rPr lang="en-US" smtClean="0"/>
-              <a:t>8/18/2022</a:t>
+              <a:t>8/19/2022</a:t>
             </a:fld>
             <a:endParaRPr lang="en-US" dirty="0"/>
           </a:p>
@@ -33171,506 +33370,6 @@
           </a:p>
         </p:txBody>
       </p:sp>
-      <p:sp>
-        <p:nvSpPr>
-          <p:cNvPr id="32" name="矩形: 圆角 31">
-            <a:extLst>
-              <a:ext uri="{FF2B5EF4-FFF2-40B4-BE49-F238E27FC236}">
-                <a16:creationId xmlns:a16="http://schemas.microsoft.com/office/drawing/2014/main" id="{7A85AA2F-4407-8582-B38F-3A50F03DDAAE}"/>
-              </a:ext>
-            </a:extLst>
-          </p:cNvPr>
-          <p:cNvSpPr/>
-          <p:nvPr/>
-        </p:nvSpPr>
-        <p:spPr>
-          <a:xfrm>
-            <a:off x="2870348" y="4936469"/>
-            <a:ext cx="1913107" cy="1029726"/>
-          </a:xfrm>
-          <a:prstGeom prst="roundRect">
-            <a:avLst/>
-          </a:prstGeom>
-          <a:solidFill>
-            <a:srgbClr val="FFF2CC"/>
-          </a:solidFill>
-          <a:effectLst>
-            <a:outerShdw blurRad="50800" dist="38100" dir="5400000" algn="t" rotWithShape="0">
-              <a:prstClr val="black">
-                <a:alpha val="40000"/>
-              </a:prstClr>
-            </a:outerShdw>
-          </a:effectLst>
-        </p:spPr>
-        <p:style>
-          <a:lnRef idx="2">
-            <a:schemeClr val="accent1">
-              <a:shade val="50000"/>
-            </a:schemeClr>
-          </a:lnRef>
-          <a:fillRef idx="1">
-            <a:schemeClr val="accent1"/>
-          </a:fillRef>
-          <a:effectRef idx="0">
-            <a:schemeClr val="accent1"/>
-          </a:effectRef>
-          <a:fontRef idx="minor">
-            <a:schemeClr val="lt1"/>
-          </a:fontRef>
-        </p:style>
-        <p:txBody>
-          <a:bodyPr rtlCol="0" anchor="ctr"/>
-          <a:lstStyle/>
-          <a:p>
-            <a:pPr algn="ctr"/>
-            <a:r>
-              <a:rPr lang="en-US" altLang="zh-CN" sz="2000">
-                <a:solidFill>
-                  <a:schemeClr val="tx1"/>
-                </a:solidFill>
-              </a:rPr>
-              <a:t>Bicubic</a:t>
-            </a:r>
-          </a:p>
-          <a:p>
-            <a:pPr algn="ctr"/>
-            <a:r>
-              <a:rPr lang="zh-CN" altLang="en-US" sz="2000">
-                <a:solidFill>
-                  <a:schemeClr val="tx1"/>
-                </a:solidFill>
-              </a:rPr>
-              <a:t>双三次插值</a:t>
-            </a:r>
-          </a:p>
-        </p:txBody>
-      </p:sp>
-      <p:sp>
-        <p:nvSpPr>
-          <p:cNvPr id="33" name="矩形: 圆角 32">
-            <a:extLst>
-              <a:ext uri="{FF2B5EF4-FFF2-40B4-BE49-F238E27FC236}">
-                <a16:creationId xmlns:a16="http://schemas.microsoft.com/office/drawing/2014/main" id="{3CFA0E17-8E39-0C61-C415-FFF3733A2CE8}"/>
-              </a:ext>
-            </a:extLst>
-          </p:cNvPr>
-          <p:cNvSpPr/>
-          <p:nvPr/>
-        </p:nvSpPr>
-        <p:spPr>
-          <a:xfrm>
-            <a:off x="6705543" y="4878692"/>
-            <a:ext cx="2175137" cy="1145283"/>
-          </a:xfrm>
-          <a:prstGeom prst="roundRect">
-            <a:avLst/>
-          </a:prstGeom>
-          <a:solidFill>
-            <a:srgbClr val="FFF2CC"/>
-          </a:solidFill>
-          <a:effectLst>
-            <a:outerShdw blurRad="50800" dist="38100" dir="5400000" algn="t" rotWithShape="0">
-              <a:prstClr val="black">
-                <a:alpha val="40000"/>
-              </a:prstClr>
-            </a:outerShdw>
-          </a:effectLst>
-        </p:spPr>
-        <p:style>
-          <a:lnRef idx="2">
-            <a:schemeClr val="accent1">
-              <a:shade val="50000"/>
-            </a:schemeClr>
-          </a:lnRef>
-          <a:fillRef idx="1">
-            <a:schemeClr val="accent1"/>
-          </a:fillRef>
-          <a:effectRef idx="0">
-            <a:schemeClr val="accent1"/>
-          </a:effectRef>
-          <a:fontRef idx="minor">
-            <a:schemeClr val="lt1"/>
-          </a:fontRef>
-        </p:style>
-        <p:txBody>
-          <a:bodyPr rtlCol="0" anchor="ctr"/>
-          <a:lstStyle/>
-          <a:p>
-            <a:pPr algn="ctr"/>
-            <a:r>
-              <a:rPr lang="zh-CN" altLang="en-US" sz="2000">
-                <a:solidFill>
-                  <a:schemeClr val="tx1"/>
-                </a:solidFill>
-              </a:rPr>
-              <a:t>基于纹理分类的锐化增强</a:t>
-            </a:r>
-          </a:p>
-        </p:txBody>
-      </p:sp>
-      <p:cxnSp>
-        <p:nvCxnSpPr>
-          <p:cNvPr id="34" name="直接箭头连接符 33">
-            <a:extLst>
-              <a:ext uri="{FF2B5EF4-FFF2-40B4-BE49-F238E27FC236}">
-                <a16:creationId xmlns:a16="http://schemas.microsoft.com/office/drawing/2014/main" id="{EE64C11F-F372-02ED-79F4-3BFCA6157748}"/>
-              </a:ext>
-            </a:extLst>
-          </p:cNvPr>
-          <p:cNvCxnSpPr>
-            <a:cxnSpLocks/>
-            <a:stCxn id="35" idx="3"/>
-            <a:endCxn id="32" idx="1"/>
-          </p:cNvCxnSpPr>
-          <p:nvPr/>
-        </p:nvCxnSpPr>
-        <p:spPr>
-          <a:xfrm flipV="1">
-            <a:off x="2245314" y="5451332"/>
-            <a:ext cx="625034" cy="1"/>
-          </a:xfrm>
-          <a:prstGeom prst="straightConnector1">
-            <a:avLst/>
-          </a:prstGeom>
-          <a:ln w="25400">
-            <a:tailEnd type="triangle"/>
-          </a:ln>
-        </p:spPr>
-        <p:style>
-          <a:lnRef idx="1">
-            <a:schemeClr val="accent1"/>
-          </a:lnRef>
-          <a:fillRef idx="0">
-            <a:schemeClr val="accent1"/>
-          </a:fillRef>
-          <a:effectRef idx="0">
-            <a:schemeClr val="accent1"/>
-          </a:effectRef>
-          <a:fontRef idx="minor">
-            <a:schemeClr val="tx1"/>
-          </a:fontRef>
-        </p:style>
-      </p:cxnSp>
-      <p:sp>
-        <p:nvSpPr>
-          <p:cNvPr id="35" name="文本框 34">
-            <a:extLst>
-              <a:ext uri="{FF2B5EF4-FFF2-40B4-BE49-F238E27FC236}">
-                <a16:creationId xmlns:a16="http://schemas.microsoft.com/office/drawing/2014/main" id="{51060BB6-2595-AA96-598F-CA2356D70956}"/>
-              </a:ext>
-            </a:extLst>
-          </p:cNvPr>
-          <p:cNvSpPr txBox="1"/>
-          <p:nvPr/>
-        </p:nvSpPr>
-        <p:spPr>
-          <a:xfrm>
-            <a:off x="1734748" y="5220500"/>
-            <a:ext cx="510566" cy="461665"/>
-          </a:xfrm>
-          <a:prstGeom prst="rect">
-            <a:avLst/>
-          </a:prstGeom>
-          <a:noFill/>
-        </p:spPr>
-        <p:txBody>
-          <a:bodyPr wrap="square" rtlCol="0">
-            <a:spAutoFit/>
-          </a:bodyPr>
-          <a:lstStyle/>
-          <a:p>
-            <a:r>
-              <a:rPr lang="en-US" altLang="zh-CN" sz="2400">
-                <a:solidFill>
-                  <a:schemeClr val="bg2">
-                    <a:lumMod val="25000"/>
-                  </a:schemeClr>
-                </a:solidFill>
-              </a:rPr>
-              <a:t>LR</a:t>
-            </a:r>
-            <a:endParaRPr lang="zh-CN" altLang="en-US" sz="2400">
-              <a:solidFill>
-                <a:schemeClr val="bg2">
-                  <a:lumMod val="25000"/>
-                </a:schemeClr>
-              </a:solidFill>
-            </a:endParaRPr>
-          </a:p>
-        </p:txBody>
-      </p:sp>
-      <p:sp>
-        <p:nvSpPr>
-          <p:cNvPr id="36" name="文本框 35">
-            <a:extLst>
-              <a:ext uri="{FF2B5EF4-FFF2-40B4-BE49-F238E27FC236}">
-                <a16:creationId xmlns:a16="http://schemas.microsoft.com/office/drawing/2014/main" id="{350C5BB4-1771-009B-2C0C-852442D99B2D}"/>
-              </a:ext>
-            </a:extLst>
-          </p:cNvPr>
-          <p:cNvSpPr txBox="1"/>
-          <p:nvPr/>
-        </p:nvSpPr>
-        <p:spPr>
-          <a:xfrm>
-            <a:off x="5248574" y="5221226"/>
-            <a:ext cx="1123061" cy="461665"/>
-          </a:xfrm>
-          <a:prstGeom prst="rect">
-            <a:avLst/>
-          </a:prstGeom>
-          <a:noFill/>
-        </p:spPr>
-        <p:txBody>
-          <a:bodyPr wrap="square" rtlCol="0">
-            <a:spAutoFit/>
-          </a:bodyPr>
-          <a:lstStyle/>
-          <a:p>
-            <a:r>
-              <a:rPr lang="en-US" altLang="zh-CN" sz="2400" b="1"/>
-              <a:t>Pre-SR</a:t>
-            </a:r>
-            <a:endParaRPr lang="zh-CN" altLang="en-US" sz="2400" b="1"/>
-          </a:p>
-        </p:txBody>
-      </p:sp>
-      <p:cxnSp>
-        <p:nvCxnSpPr>
-          <p:cNvPr id="37" name="直接箭头连接符 36">
-            <a:extLst>
-              <a:ext uri="{FF2B5EF4-FFF2-40B4-BE49-F238E27FC236}">
-                <a16:creationId xmlns:a16="http://schemas.microsoft.com/office/drawing/2014/main" id="{C5A58357-3E4F-07E5-D9E1-92F984227C8E}"/>
-              </a:ext>
-            </a:extLst>
-          </p:cNvPr>
-          <p:cNvCxnSpPr>
-            <a:cxnSpLocks/>
-            <a:stCxn id="32" idx="3"/>
-            <a:endCxn id="36" idx="1"/>
-          </p:cNvCxnSpPr>
-          <p:nvPr/>
-        </p:nvCxnSpPr>
-        <p:spPr>
-          <a:xfrm>
-            <a:off x="4783455" y="5451332"/>
-            <a:ext cx="465119" cy="727"/>
-          </a:xfrm>
-          <a:prstGeom prst="straightConnector1">
-            <a:avLst/>
-          </a:prstGeom>
-          <a:ln w="25400">
-            <a:tailEnd type="triangle"/>
-          </a:ln>
-        </p:spPr>
-        <p:style>
-          <a:lnRef idx="1">
-            <a:schemeClr val="accent1"/>
-          </a:lnRef>
-          <a:fillRef idx="0">
-            <a:schemeClr val="accent1"/>
-          </a:fillRef>
-          <a:effectRef idx="0">
-            <a:schemeClr val="accent1"/>
-          </a:effectRef>
-          <a:fontRef idx="minor">
-            <a:schemeClr val="tx1"/>
-          </a:fontRef>
-        </p:style>
-      </p:cxnSp>
-      <p:cxnSp>
-        <p:nvCxnSpPr>
-          <p:cNvPr id="38" name="直接箭头连接符 37">
-            <a:extLst>
-              <a:ext uri="{FF2B5EF4-FFF2-40B4-BE49-F238E27FC236}">
-                <a16:creationId xmlns:a16="http://schemas.microsoft.com/office/drawing/2014/main" id="{F6CAA837-5C51-6E3F-ECC7-3CCB4390A85E}"/>
-              </a:ext>
-            </a:extLst>
-          </p:cNvPr>
-          <p:cNvCxnSpPr>
-            <a:cxnSpLocks/>
-            <a:stCxn id="36" idx="3"/>
-            <a:endCxn id="33" idx="1"/>
-          </p:cNvCxnSpPr>
-          <p:nvPr/>
-        </p:nvCxnSpPr>
-        <p:spPr>
-          <a:xfrm flipV="1">
-            <a:off x="6371635" y="5451334"/>
-            <a:ext cx="333908" cy="725"/>
-          </a:xfrm>
-          <a:prstGeom prst="straightConnector1">
-            <a:avLst/>
-          </a:prstGeom>
-          <a:ln w="25400">
-            <a:tailEnd type="triangle"/>
-          </a:ln>
-        </p:spPr>
-        <p:style>
-          <a:lnRef idx="1">
-            <a:schemeClr val="accent1"/>
-          </a:lnRef>
-          <a:fillRef idx="0">
-            <a:schemeClr val="accent1"/>
-          </a:fillRef>
-          <a:effectRef idx="0">
-            <a:schemeClr val="accent1"/>
-          </a:effectRef>
-          <a:fontRef idx="minor">
-            <a:schemeClr val="tx1"/>
-          </a:fontRef>
-        </p:style>
-      </p:cxnSp>
-      <p:sp>
-        <p:nvSpPr>
-          <p:cNvPr id="39" name="文本框 38">
-            <a:extLst>
-              <a:ext uri="{FF2B5EF4-FFF2-40B4-BE49-F238E27FC236}">
-                <a16:creationId xmlns:a16="http://schemas.microsoft.com/office/drawing/2014/main" id="{495C86B6-AC9D-81B2-F2A5-89EE664ADCA0}"/>
-              </a:ext>
-            </a:extLst>
-          </p:cNvPr>
-          <p:cNvSpPr txBox="1"/>
-          <p:nvPr/>
-        </p:nvSpPr>
-        <p:spPr>
-          <a:xfrm>
-            <a:off x="9377748" y="5220500"/>
-            <a:ext cx="580785" cy="461665"/>
-          </a:xfrm>
-          <a:prstGeom prst="rect">
-            <a:avLst/>
-          </a:prstGeom>
-          <a:noFill/>
-        </p:spPr>
-        <p:txBody>
-          <a:bodyPr wrap="square" rtlCol="0">
-            <a:spAutoFit/>
-          </a:bodyPr>
-          <a:lstStyle/>
-          <a:p>
-            <a:r>
-              <a:rPr lang="en-US" altLang="zh-CN" sz="2400">
-                <a:solidFill>
-                  <a:srgbClr val="FF0000"/>
-                </a:solidFill>
-              </a:rPr>
-              <a:t>SR</a:t>
-            </a:r>
-            <a:endParaRPr lang="zh-CN" altLang="en-US" sz="2400">
-              <a:solidFill>
-                <a:srgbClr val="FF0000"/>
-              </a:solidFill>
-            </a:endParaRPr>
-          </a:p>
-        </p:txBody>
-      </p:sp>
-      <p:cxnSp>
-        <p:nvCxnSpPr>
-          <p:cNvPr id="40" name="直接箭头连接符 39">
-            <a:extLst>
-              <a:ext uri="{FF2B5EF4-FFF2-40B4-BE49-F238E27FC236}">
-                <a16:creationId xmlns:a16="http://schemas.microsoft.com/office/drawing/2014/main" id="{E78D1E68-397E-2739-B9FE-C12BA97CA781}"/>
-              </a:ext>
-            </a:extLst>
-          </p:cNvPr>
-          <p:cNvCxnSpPr>
-            <a:cxnSpLocks/>
-            <a:stCxn id="33" idx="3"/>
-            <a:endCxn id="39" idx="1"/>
-          </p:cNvCxnSpPr>
-          <p:nvPr/>
-        </p:nvCxnSpPr>
-        <p:spPr>
-          <a:xfrm flipV="1">
-            <a:off x="8880680" y="5451333"/>
-            <a:ext cx="497068" cy="1"/>
-          </a:xfrm>
-          <a:prstGeom prst="straightConnector1">
-            <a:avLst/>
-          </a:prstGeom>
-          <a:ln w="25400">
-            <a:tailEnd type="triangle"/>
-          </a:ln>
-        </p:spPr>
-        <p:style>
-          <a:lnRef idx="1">
-            <a:schemeClr val="accent1"/>
-          </a:lnRef>
-          <a:fillRef idx="0">
-            <a:schemeClr val="accent1"/>
-          </a:fillRef>
-          <a:effectRef idx="0">
-            <a:schemeClr val="accent1"/>
-          </a:effectRef>
-          <a:fontRef idx="minor">
-            <a:schemeClr val="tx1"/>
-          </a:fontRef>
-        </p:style>
-      </p:cxnSp>
-      <p:sp>
-        <p:nvSpPr>
-          <p:cNvPr id="41" name="文本框 40">
-            <a:extLst>
-              <a:ext uri="{FF2B5EF4-FFF2-40B4-BE49-F238E27FC236}">
-                <a16:creationId xmlns:a16="http://schemas.microsoft.com/office/drawing/2014/main" id="{B7F0C496-006B-0470-B6A9-99EF3A625107}"/>
-              </a:ext>
-            </a:extLst>
-          </p:cNvPr>
-          <p:cNvSpPr txBox="1"/>
-          <p:nvPr/>
-        </p:nvSpPr>
-        <p:spPr>
-          <a:xfrm>
-            <a:off x="3683518" y="6160133"/>
-            <a:ext cx="3920561" cy="369332"/>
-          </a:xfrm>
-          <a:prstGeom prst="rect">
-            <a:avLst/>
-          </a:prstGeom>
-          <a:noFill/>
-        </p:spPr>
-        <p:txBody>
-          <a:bodyPr wrap="square">
-            <a:spAutoFit/>
-          </a:bodyPr>
-          <a:lstStyle/>
-          <a:p>
-            <a:pPr algn="ctr"/>
-            <a:r>
-              <a:rPr lang="en-US" altLang="zh-CN" sz="1800" b="1" i="0">
-                <a:solidFill>
-                  <a:srgbClr val="000000"/>
-                </a:solidFill>
-                <a:effectLst/>
-                <a:latin typeface="CMBX12"/>
-              </a:rPr>
-              <a:t>LBP-RAISR </a:t>
-            </a:r>
-            <a:r>
-              <a:rPr lang="zh-CN" altLang="en-US" sz="1800" b="1" i="0">
-                <a:solidFill>
-                  <a:srgbClr val="000000"/>
-                </a:solidFill>
-                <a:effectLst/>
-                <a:latin typeface="CMBX12"/>
-              </a:rPr>
-              <a:t>算法基本架构</a:t>
-            </a:r>
-            <a:r>
-              <a:rPr lang="en-US" altLang="zh-CN" sz="1800" b="1" i="0">
-                <a:solidFill>
-                  <a:srgbClr val="000000"/>
-                </a:solidFill>
-                <a:effectLst/>
-                <a:latin typeface="CMBX12"/>
-              </a:rPr>
-              <a:t> </a:t>
-            </a:r>
-            <a:endParaRPr lang="zh-CN" altLang="en-US"/>
-          </a:p>
-        </p:txBody>
-      </p:sp>
       <p:pic>
         <p:nvPicPr>
           <p:cNvPr id="5" name="图片 4">
@@ -33693,8 +33392,178 @@
         </p:blipFill>
         <p:spPr>
           <a:xfrm>
-            <a:off x="1022636" y="1048505"/>
-            <a:ext cx="9634186" cy="3581814"/>
+            <a:off x="1984722" y="549693"/>
+            <a:ext cx="8764963" cy="3258653"/>
+          </a:xfrm>
+          <a:prstGeom prst="rect">
+            <a:avLst/>
+          </a:prstGeom>
+        </p:spPr>
+      </p:pic>
+      <p:sp>
+        <p:nvSpPr>
+          <p:cNvPr id="3" name="文本框 2">
+            <a:extLst>
+              <a:ext uri="{FF2B5EF4-FFF2-40B4-BE49-F238E27FC236}">
+                <a16:creationId xmlns:a16="http://schemas.microsoft.com/office/drawing/2014/main" id="{1C1F561C-65A9-9281-0843-883530DAAEE1}"/>
+              </a:ext>
+            </a:extLst>
+          </p:cNvPr>
+          <p:cNvSpPr txBox="1"/>
+          <p:nvPr/>
+        </p:nvSpPr>
+        <p:spPr>
+          <a:xfrm>
+            <a:off x="567083" y="3926657"/>
+            <a:ext cx="4746543" cy="2520370"/>
+          </a:xfrm>
+          <a:prstGeom prst="rect">
+            <a:avLst/>
+          </a:prstGeom>
+          <a:noFill/>
+        </p:spPr>
+        <p:txBody>
+          <a:bodyPr wrap="square" rtlCol="0">
+            <a:spAutoFit/>
+          </a:bodyPr>
+          <a:lstStyle/>
+          <a:p>
+            <a:pPr>
+              <a:lnSpc>
+                <a:spcPct val="150000"/>
+              </a:lnSpc>
+            </a:pPr>
+            <a:r>
+              <a:rPr lang="en-US" altLang="zh-CN" sz="1800" b="0" i="0">
+                <a:solidFill>
+                  <a:srgbClr val="000000"/>
+                </a:solidFill>
+                <a:effectLst/>
+                <a:latin typeface="黑体" panose="02010609060101010101" pitchFamily="49" charset="-122"/>
+                <a:ea typeface="黑体" panose="02010609060101010101" pitchFamily="49" charset="-122"/>
+              </a:rPr>
+              <a:t>Census Transform</a:t>
+            </a:r>
+            <a:r>
+              <a:rPr lang="zh-CN" altLang="en-US" sz="1800" b="0" i="0">
+                <a:solidFill>
+                  <a:srgbClr val="000000"/>
+                </a:solidFill>
+                <a:effectLst/>
+                <a:latin typeface="黑体" panose="02010609060101010101" pitchFamily="49" charset="-122"/>
+                <a:ea typeface="黑体" panose="02010609060101010101" pitchFamily="49" charset="-122"/>
+              </a:rPr>
+              <a:t>：</a:t>
+            </a:r>
+            <a:endParaRPr lang="en-US" altLang="zh-CN" sz="1800" b="0" i="0">
+              <a:solidFill>
+                <a:srgbClr val="000000"/>
+              </a:solidFill>
+              <a:effectLst/>
+              <a:latin typeface="黑体" panose="02010609060101010101" pitchFamily="49" charset="-122"/>
+              <a:ea typeface="黑体" panose="02010609060101010101" pitchFamily="49" charset="-122"/>
+            </a:endParaRPr>
+          </a:p>
+          <a:p>
+            <a:pPr>
+              <a:lnSpc>
+                <a:spcPct val="150000"/>
+              </a:lnSpc>
+            </a:pPr>
+            <a:r>
+              <a:rPr lang="en-US" altLang="zh-CN">
+                <a:solidFill>
+                  <a:srgbClr val="000000"/>
+                </a:solidFill>
+                <a:latin typeface="黑体" panose="02010609060101010101" pitchFamily="49" charset="-122"/>
+                <a:ea typeface="黑体" panose="02010609060101010101" pitchFamily="49" charset="-122"/>
+              </a:rPr>
+              <a:t>	</a:t>
+            </a:r>
+            <a:r>
+              <a:rPr lang="zh-CN" altLang="en-US">
+                <a:solidFill>
+                  <a:srgbClr val="000000"/>
+                </a:solidFill>
+                <a:latin typeface="黑体" panose="02010609060101010101" pitchFamily="49" charset="-122"/>
+                <a:ea typeface="黑体" panose="02010609060101010101" pitchFamily="49" charset="-122"/>
+              </a:rPr>
+              <a:t>在图像中定义一个矩形窗口，矩形窗口遍历图像。以中心像素为参考像素，每个像素的灰度值与参考像素的灰度值比较，小于或等于参考值记为</a:t>
+            </a:r>
+            <a:r>
+              <a:rPr lang="en-US" altLang="zh-CN">
+                <a:solidFill>
+                  <a:srgbClr val="000000"/>
+                </a:solidFill>
+                <a:latin typeface="黑体" panose="02010609060101010101" pitchFamily="49" charset="-122"/>
+                <a:ea typeface="黑体" panose="02010609060101010101" pitchFamily="49" charset="-122"/>
+              </a:rPr>
+              <a:t>0</a:t>
+            </a:r>
+            <a:r>
+              <a:rPr lang="zh-CN" altLang="en-US">
+                <a:solidFill>
+                  <a:srgbClr val="000000"/>
+                </a:solidFill>
+                <a:latin typeface="黑体" panose="02010609060101010101" pitchFamily="49" charset="-122"/>
+                <a:ea typeface="黑体" panose="02010609060101010101" pitchFamily="49" charset="-122"/>
+              </a:rPr>
+              <a:t>，否则记为</a:t>
+            </a:r>
+            <a:r>
+              <a:rPr lang="en-US" altLang="zh-CN">
+                <a:solidFill>
+                  <a:srgbClr val="000000"/>
+                </a:solidFill>
+                <a:latin typeface="黑体" panose="02010609060101010101" pitchFamily="49" charset="-122"/>
+                <a:ea typeface="黑体" panose="02010609060101010101" pitchFamily="49" charset="-122"/>
+              </a:rPr>
+              <a:t>1</a:t>
+            </a:r>
+            <a:r>
+              <a:rPr lang="zh-CN" altLang="en-US">
+                <a:solidFill>
+                  <a:srgbClr val="000000"/>
+                </a:solidFill>
+                <a:latin typeface="黑体" panose="02010609060101010101" pitchFamily="49" charset="-122"/>
+                <a:ea typeface="黑体" panose="02010609060101010101" pitchFamily="49" charset="-122"/>
+              </a:rPr>
+              <a:t>。最后按位连接得到二进制编码流。</a:t>
+            </a:r>
+            <a:endParaRPr lang="zh-CN" altLang="en-US" dirty="0">
+              <a:solidFill>
+                <a:srgbClr val="000000"/>
+              </a:solidFill>
+              <a:latin typeface="黑体" panose="02010609060101010101" pitchFamily="49" charset="-122"/>
+              <a:ea typeface="黑体" panose="02010609060101010101" pitchFamily="49" charset="-122"/>
+            </a:endParaRPr>
+          </a:p>
+        </p:txBody>
+      </p:sp>
+      <p:pic>
+        <p:nvPicPr>
+          <p:cNvPr id="8" name="图片 7" descr="形状&#10;&#10;中度可信度描述已自动生成">
+            <a:extLst>
+              <a:ext uri="{FF2B5EF4-FFF2-40B4-BE49-F238E27FC236}">
+                <a16:creationId xmlns:a16="http://schemas.microsoft.com/office/drawing/2014/main" id="{E383CB73-B86E-24C3-7319-FD9384E0506D}"/>
+              </a:ext>
+            </a:extLst>
+          </p:cNvPr>
+          <p:cNvPicPr>
+            <a:picLocks noChangeAspect="1"/>
+          </p:cNvPicPr>
+          <p:nvPr/>
+        </p:nvPicPr>
+        <p:blipFill>
+          <a:blip r:embed="rId6"/>
+          <a:stretch>
+            <a:fillRect/>
+          </a:stretch>
+        </p:blipFill>
+        <p:spPr>
+          <a:xfrm>
+            <a:off x="5651829" y="4499719"/>
+            <a:ext cx="3186071" cy="841280"/>
           </a:xfrm>
           <a:prstGeom prst="rect">
             <a:avLst/>
@@ -42282,7 +42151,7 @@
         </p:nvSpPr>
         <p:spPr>
           <a:xfrm>
-            <a:off x="4152899" y="758394"/>
+            <a:off x="4152899" y="512351"/>
             <a:ext cx="3886200" cy="715581"/>
           </a:xfrm>
           <a:prstGeom prst="rect">
@@ -42477,375 +42346,6 @@
           </a:p>
         </p:txBody>
       </p:sp>
-      <p:graphicFrame>
-        <p:nvGraphicFramePr>
-          <p:cNvPr id="21" name="表格 4">
-            <a:extLst>
-              <a:ext uri="{FF2B5EF4-FFF2-40B4-BE49-F238E27FC236}">
-                <a16:creationId xmlns:a16="http://schemas.microsoft.com/office/drawing/2014/main" id="{E9A2868E-7173-9018-E27D-4F16532EAD19}"/>
-              </a:ext>
-            </a:extLst>
-          </p:cNvPr>
-          <p:cNvGraphicFramePr>
-            <a:graphicFrameLocks noGrp="1"/>
-          </p:cNvGraphicFramePr>
-          <p:nvPr>
-            <p:extLst>
-              <p:ext uri="{D42A27DB-BD31-4B8C-83A1-F6EECF244321}">
-                <p14:modId xmlns:p14="http://schemas.microsoft.com/office/powerpoint/2010/main" val="3570637105"/>
-              </p:ext>
-            </p:extLst>
-          </p:nvPr>
-        </p:nvGraphicFramePr>
-        <p:xfrm>
-          <a:off x="2032000" y="4844190"/>
-          <a:ext cx="8128002" cy="1112520"/>
-        </p:xfrm>
-        <a:graphic>
-          <a:graphicData uri="http://schemas.openxmlformats.org/drawingml/2006/table">
-            <a:tbl>
-              <a:tblPr firstRow="1" bandRow="1">
-                <a:tableStyleId>{5C22544A-7EE6-4342-B048-85BDC9FD1C3A}</a:tableStyleId>
-              </a:tblPr>
-              <a:tblGrid>
-                <a:gridCol w="1354667">
-                  <a:extLst>
-                    <a:ext uri="{9D8B030D-6E8A-4147-A177-3AD203B41FA5}">
-                      <a16:colId xmlns:a16="http://schemas.microsoft.com/office/drawing/2014/main" val="3125731378"/>
-                    </a:ext>
-                  </a:extLst>
-                </a:gridCol>
-                <a:gridCol w="1354667">
-                  <a:extLst>
-                    <a:ext uri="{9D8B030D-6E8A-4147-A177-3AD203B41FA5}">
-                      <a16:colId xmlns:a16="http://schemas.microsoft.com/office/drawing/2014/main" val="1360789012"/>
-                    </a:ext>
-                  </a:extLst>
-                </a:gridCol>
-                <a:gridCol w="1354667">
-                  <a:extLst>
-                    <a:ext uri="{9D8B030D-6E8A-4147-A177-3AD203B41FA5}">
-                      <a16:colId xmlns:a16="http://schemas.microsoft.com/office/drawing/2014/main" val="3762960461"/>
-                    </a:ext>
-                  </a:extLst>
-                </a:gridCol>
-                <a:gridCol w="1354667">
-                  <a:extLst>
-                    <a:ext uri="{9D8B030D-6E8A-4147-A177-3AD203B41FA5}">
-                      <a16:colId xmlns:a16="http://schemas.microsoft.com/office/drawing/2014/main" val="642984712"/>
-                    </a:ext>
-                  </a:extLst>
-                </a:gridCol>
-                <a:gridCol w="1354667">
-                  <a:extLst>
-                    <a:ext uri="{9D8B030D-6E8A-4147-A177-3AD203B41FA5}">
-                      <a16:colId xmlns:a16="http://schemas.microsoft.com/office/drawing/2014/main" val="3539214996"/>
-                    </a:ext>
-                  </a:extLst>
-                </a:gridCol>
-                <a:gridCol w="1354667">
-                  <a:extLst>
-                    <a:ext uri="{9D8B030D-6E8A-4147-A177-3AD203B41FA5}">
-                      <a16:colId xmlns:a16="http://schemas.microsoft.com/office/drawing/2014/main" val="3852457372"/>
-                    </a:ext>
-                  </a:extLst>
-                </a:gridCol>
-              </a:tblGrid>
-              <a:tr h="370840">
-                <a:tc>
-                  <a:txBody>
-                    <a:bodyPr/>
-                    <a:lstStyle/>
-                    <a:p>
-                      <a:pPr algn="ctr"/>
-                      <a:r>
-                        <a:rPr lang="en-US" altLang="zh-CN" dirty="0"/>
-                        <a:t>IP</a:t>
-                      </a:r>
-                      <a:endParaRPr lang="zh-CN" altLang="en-US" dirty="0"/>
-                    </a:p>
-                  </a:txBody>
-                  <a:tcPr/>
-                </a:tc>
-                <a:tc>
-                  <a:txBody>
-                    <a:bodyPr/>
-                    <a:lstStyle/>
-                    <a:p>
-                      <a:pPr algn="ctr"/>
-                      <a:r>
-                        <a:rPr lang="en-US" altLang="zh-CN" dirty="0"/>
-                        <a:t>LUT</a:t>
-                      </a:r>
-                      <a:endParaRPr lang="zh-CN" altLang="en-US" dirty="0"/>
-                    </a:p>
-                  </a:txBody>
-                  <a:tcPr/>
-                </a:tc>
-                <a:tc>
-                  <a:txBody>
-                    <a:bodyPr/>
-                    <a:lstStyle/>
-                    <a:p>
-                      <a:pPr algn="ctr"/>
-                      <a:r>
-                        <a:rPr lang="en-US" altLang="zh-CN" dirty="0"/>
-                        <a:t>FF</a:t>
-                      </a:r>
-                      <a:endParaRPr lang="zh-CN" altLang="en-US" dirty="0"/>
-                    </a:p>
-                  </a:txBody>
-                  <a:tcPr/>
-                </a:tc>
-                <a:tc>
-                  <a:txBody>
-                    <a:bodyPr/>
-                    <a:lstStyle/>
-                    <a:p>
-                      <a:pPr algn="ctr"/>
-                      <a:r>
-                        <a:rPr lang="en-US" altLang="zh-CN" dirty="0"/>
-                        <a:t>BRAM</a:t>
-                      </a:r>
-                      <a:endParaRPr lang="zh-CN" altLang="en-US" dirty="0"/>
-                    </a:p>
-                  </a:txBody>
-                  <a:tcPr/>
-                </a:tc>
-                <a:tc>
-                  <a:txBody>
-                    <a:bodyPr/>
-                    <a:lstStyle/>
-                    <a:p>
-                      <a:pPr algn="ctr"/>
-                      <a:r>
-                        <a:rPr lang="en-US" altLang="zh-CN" dirty="0"/>
-                        <a:t>URAM</a:t>
-                      </a:r>
-                      <a:endParaRPr lang="zh-CN" altLang="en-US" dirty="0"/>
-                    </a:p>
-                  </a:txBody>
-                  <a:tcPr/>
-                </a:tc>
-                <a:tc>
-                  <a:txBody>
-                    <a:bodyPr/>
-                    <a:lstStyle/>
-                    <a:p>
-                      <a:pPr algn="ctr"/>
-                      <a:r>
-                        <a:rPr lang="en-US" altLang="zh-CN" dirty="0"/>
-                        <a:t>DSP</a:t>
-                      </a:r>
-                      <a:endParaRPr lang="zh-CN" altLang="en-US" dirty="0"/>
-                    </a:p>
-                  </a:txBody>
-                  <a:tcPr/>
-                </a:tc>
-                <a:extLst>
-                  <a:ext uri="{0D108BD9-81ED-4DB2-BD59-A6C34878D82A}">
-                    <a16:rowId xmlns:a16="http://schemas.microsoft.com/office/drawing/2014/main" val="2163393611"/>
-                  </a:ext>
-                </a:extLst>
-              </a:tr>
-              <a:tr h="370840">
-                <a:tc>
-                  <a:txBody>
-                    <a:bodyPr/>
-                    <a:lstStyle/>
-                    <a:p>
-                      <a:pPr algn="ctr"/>
-                      <a:r>
-                        <a:rPr lang="en-US" altLang="zh-CN"/>
-                        <a:t>Bicubic × 3</a:t>
-                      </a:r>
-                      <a:endParaRPr lang="zh-CN" altLang="en-US" dirty="0"/>
-                    </a:p>
-                  </a:txBody>
-                  <a:tcPr/>
-                </a:tc>
-                <a:tc>
-                  <a:txBody>
-                    <a:bodyPr/>
-                    <a:lstStyle/>
-                    <a:p>
-                      <a:pPr algn="ctr"/>
-                      <a:r>
-                        <a:rPr lang="en-US" altLang="zh-CN" dirty="0"/>
-                        <a:t>1323</a:t>
-                      </a:r>
-                      <a:endParaRPr lang="zh-CN" altLang="en-US" dirty="0"/>
-                    </a:p>
-                  </a:txBody>
-                  <a:tcPr/>
-                </a:tc>
-                <a:tc>
-                  <a:txBody>
-                    <a:bodyPr/>
-                    <a:lstStyle/>
-                    <a:p>
-                      <a:pPr algn="ctr"/>
-                      <a:r>
-                        <a:rPr lang="en-US" altLang="zh-CN" dirty="0"/>
-                        <a:t>2079</a:t>
-                      </a:r>
-                      <a:endParaRPr lang="zh-CN" altLang="en-US" dirty="0"/>
-                    </a:p>
-                  </a:txBody>
-                  <a:tcPr/>
-                </a:tc>
-                <a:tc>
-                  <a:txBody>
-                    <a:bodyPr/>
-                    <a:lstStyle/>
-                    <a:p>
-                      <a:pPr algn="ctr"/>
-                      <a:r>
-                        <a:rPr lang="en-US" altLang="zh-CN" dirty="0"/>
-                        <a:t>7.5</a:t>
-                      </a:r>
-                      <a:endParaRPr lang="zh-CN" altLang="en-US" dirty="0"/>
-                    </a:p>
-                  </a:txBody>
-                  <a:tcPr/>
-                </a:tc>
-                <a:tc>
-                  <a:txBody>
-                    <a:bodyPr/>
-                    <a:lstStyle/>
-                    <a:p>
-                      <a:pPr algn="ctr"/>
-                      <a:r>
-                        <a:rPr lang="en-US" altLang="zh-CN" dirty="0"/>
-                        <a:t>0</a:t>
-                      </a:r>
-                      <a:endParaRPr lang="zh-CN" altLang="en-US" dirty="0"/>
-                    </a:p>
-                  </a:txBody>
-                  <a:tcPr/>
-                </a:tc>
-                <a:tc>
-                  <a:txBody>
-                    <a:bodyPr/>
-                    <a:lstStyle/>
-                    <a:p>
-                      <a:pPr algn="ctr"/>
-                      <a:r>
-                        <a:rPr lang="en-US" altLang="zh-CN" dirty="0"/>
-                        <a:t>147</a:t>
-                      </a:r>
-                      <a:endParaRPr lang="zh-CN" altLang="en-US" dirty="0"/>
-                    </a:p>
-                  </a:txBody>
-                  <a:tcPr/>
-                </a:tc>
-                <a:extLst>
-                  <a:ext uri="{0D108BD9-81ED-4DB2-BD59-A6C34878D82A}">
-                    <a16:rowId xmlns:a16="http://schemas.microsoft.com/office/drawing/2014/main" val="1165611508"/>
-                  </a:ext>
-                </a:extLst>
-              </a:tr>
-              <a:tr h="370840">
-                <a:tc>
-                  <a:txBody>
-                    <a:bodyPr/>
-                    <a:lstStyle/>
-                    <a:p>
-                      <a:pPr algn="ctr"/>
-                      <a:r>
-                        <a:rPr lang="en-US" altLang="zh-CN" dirty="0"/>
-                        <a:t>ML-Enhance</a:t>
-                      </a:r>
-                      <a:endParaRPr lang="zh-CN" altLang="en-US" dirty="0"/>
-                    </a:p>
-                  </a:txBody>
-                  <a:tcPr/>
-                </a:tc>
-                <a:tc>
-                  <a:txBody>
-                    <a:bodyPr/>
-                    <a:lstStyle/>
-                    <a:p>
-                      <a:pPr algn="ctr"/>
-                      <a:r>
-                        <a:rPr lang="en-US" altLang="zh-CN" dirty="0"/>
-                        <a:t>4608</a:t>
-                      </a:r>
-                      <a:endParaRPr lang="zh-CN" altLang="en-US" dirty="0"/>
-                    </a:p>
-                  </a:txBody>
-                  <a:tcPr/>
-                </a:tc>
-                <a:tc>
-                  <a:txBody>
-                    <a:bodyPr/>
-                    <a:lstStyle/>
-                    <a:p>
-                      <a:pPr algn="ctr"/>
-                      <a:r>
-                        <a:rPr lang="en-US" altLang="zh-CN" dirty="0"/>
-                        <a:t>479</a:t>
-                      </a:r>
-                      <a:endParaRPr lang="zh-CN" altLang="en-US" dirty="0"/>
-                    </a:p>
-                  </a:txBody>
-                  <a:tcPr/>
-                </a:tc>
-                <a:tc>
-                  <a:txBody>
-                    <a:bodyPr/>
-                    <a:lstStyle/>
-                    <a:p>
-                      <a:pPr algn="ctr"/>
-                      <a:r>
-                        <a:rPr lang="en-US" altLang="zh-CN" dirty="0"/>
-                        <a:t>37.5</a:t>
-                      </a:r>
-                      <a:endParaRPr lang="zh-CN" altLang="en-US" dirty="0"/>
-                    </a:p>
-                  </a:txBody>
-                  <a:tcPr/>
-                </a:tc>
-                <a:tc>
-                  <a:txBody>
-                    <a:bodyPr/>
-                    <a:lstStyle/>
-                    <a:p>
-                      <a:pPr algn="ctr"/>
-                      <a:r>
-                        <a:rPr lang="en-US" altLang="zh-CN" dirty="0"/>
-                        <a:t>21</a:t>
-                      </a:r>
-                      <a:endParaRPr lang="zh-CN" altLang="en-US" dirty="0"/>
-                    </a:p>
-                  </a:txBody>
-                  <a:tcPr/>
-                </a:tc>
-                <a:tc>
-                  <a:txBody>
-                    <a:bodyPr/>
-                    <a:lstStyle/>
-                    <a:p>
-                      <a:pPr algn="ctr"/>
-                      <a:r>
-                        <a:rPr lang="en-US" altLang="zh-CN" dirty="0"/>
-                        <a:t>348</a:t>
-                      </a:r>
-                      <a:endParaRPr lang="zh-CN" altLang="en-US" dirty="0"/>
-                    </a:p>
-                  </a:txBody>
-                  <a:tcPr/>
-                </a:tc>
-                <a:extLst>
-                  <a:ext uri="{0D108BD9-81ED-4DB2-BD59-A6C34878D82A}">
-                    <a16:rowId xmlns:a16="http://schemas.microsoft.com/office/drawing/2014/main" val="805399383"/>
-                  </a:ext>
-                </a:extLst>
-              </a:tr>
-            </a:tbl>
-          </a:graphicData>
-        </a:graphic>
-      </p:graphicFrame>
       <p:sp>
         <p:nvSpPr>
           <p:cNvPr id="5" name="文本框 4">
@@ -42860,7 +42360,7 @@
         </p:nvSpPr>
         <p:spPr>
           <a:xfrm>
-            <a:off x="5193747" y="6027909"/>
+            <a:off x="5193747" y="6193732"/>
             <a:ext cx="1789120" cy="383830"/>
           </a:xfrm>
           <a:prstGeom prst="rect">
@@ -43006,14 +42506,14 @@
           <p:nvPr>
             <p:extLst>
               <p:ext uri="{D42A27DB-BD31-4B8C-83A1-F6EECF244321}">
-                <p14:modId xmlns:p14="http://schemas.microsoft.com/office/powerpoint/2010/main" val="2942028081"/>
+                <p14:modId xmlns:p14="http://schemas.microsoft.com/office/powerpoint/2010/main" val="3654891426"/>
               </p:ext>
             </p:extLst>
           </p:nvPr>
         </p:nvGraphicFramePr>
         <p:xfrm>
-          <a:off x="1443851" y="1624648"/>
-          <a:ext cx="9304295" cy="2773680"/>
+          <a:off x="2209847" y="1256081"/>
+          <a:ext cx="7975110" cy="2663699"/>
         </p:xfrm>
         <a:graphic>
           <a:graphicData uri="http://schemas.openxmlformats.org/drawingml/2006/table">
@@ -43061,13 +42561,6 @@
                   <a:extLst>
                     <a:ext uri="{9D8B030D-6E8A-4147-A177-3AD203B41FA5}">
                       <a16:colId xmlns:a16="http://schemas.microsoft.com/office/drawing/2014/main" val="801730039"/>
-                    </a:ext>
-                  </a:extLst>
-                </a:gridCol>
-                <a:gridCol w="1329185">
-                  <a:extLst>
-                    <a:ext uri="{9D8B030D-6E8A-4147-A177-3AD203B41FA5}">
-                      <a16:colId xmlns:a16="http://schemas.microsoft.com/office/drawing/2014/main" val="137375728"/>
                     </a:ext>
                   </a:extLst>
                 </a:gridCol>
@@ -43210,48 +42703,6 @@
                   </a:txBody>
                   <a:tcPr anchor="ctr"/>
                 </a:tc>
-                <a:tc>
-                  <a:txBody>
-                    <a:bodyPr/>
-                    <a:lstStyle/>
-                    <a:p>
-                      <a:pPr marL="0" algn="ctr" defTabSz="914400" rtl="0" eaLnBrk="1" latinLnBrk="0" hangingPunct="1"/>
-                      <a:r>
-                        <a:rPr lang="en-US" sz="1600" b="1" kern="1200" baseline="0" dirty="0">
-                          <a:solidFill>
-                            <a:schemeClr val="lt1"/>
-                          </a:solidFill>
-                          <a:latin typeface="+mn-lt"/>
-                          <a:ea typeface="+mn-ea"/>
-                          <a:cs typeface="+mn-cs"/>
-                        </a:rPr>
-                        <a:t>LBP-RAISR</a:t>
-                      </a:r>
-                      <a:br>
-                        <a:rPr lang="en-US" sz="1600" b="1" kern="1200" baseline="0" dirty="0">
-                          <a:solidFill>
-                            <a:schemeClr val="lt1"/>
-                          </a:solidFill>
-                          <a:latin typeface="+mn-lt"/>
-                          <a:ea typeface="+mn-ea"/>
-                          <a:cs typeface="+mn-cs"/>
-                        </a:rPr>
-                      </a:br>
-                      <a:r>
-                        <a:rPr lang="en-US" sz="1600" b="1" kern="1200" baseline="0" dirty="0">
-                          <a:solidFill>
-                            <a:schemeClr val="lt1"/>
-                          </a:solidFill>
-                          <a:latin typeface="+mn-lt"/>
-                          <a:ea typeface="+mn-ea"/>
-                          <a:cs typeface="+mn-cs"/>
-                        </a:rPr>
-                        <a:t>(Quantized)</a:t>
-                      </a:r>
-                    </a:p>
-                  </a:txBody>
-                  <a:tcPr anchor="ctr"/>
-                </a:tc>
                 <a:extLst>
                   <a:ext uri="{0D108BD9-81ED-4DB2-BD59-A6C34878D82A}">
                     <a16:rowId xmlns:a16="http://schemas.microsoft.com/office/drawing/2014/main" val="4046596962"/>
@@ -43371,7 +42822,7 @@
                     <a:p>
                       <a:pPr marL="0" algn="ctr" defTabSz="914400" rtl="0" eaLnBrk="1" latinLnBrk="0" hangingPunct="1"/>
                       <a:r>
-                        <a:rPr lang="en-US" sz="1800" b="0" kern="1200" baseline="0" dirty="0">
+                        <a:rPr lang="en-US" sz="1800" b="0" kern="1200" baseline="0">
                           <a:solidFill>
                             <a:srgbClr val="FF0000"/>
                           </a:solidFill>
@@ -43379,29 +42830,16 @@
                           <a:ea typeface="+mn-ea"/>
                           <a:cs typeface="+mn-cs"/>
                         </a:rPr>
-                        <a:t>27.61 </a:t>
+                        <a:t>27.45 </a:t>
                       </a:r>
-                    </a:p>
-                  </a:txBody>
-                  <a:tcPr anchor="ctr"/>
-                </a:tc>
-                <a:tc>
-                  <a:txBody>
-                    <a:bodyPr/>
-                    <a:lstStyle/>
-                    <a:p>
-                      <a:pPr marL="0" algn="ctr" defTabSz="914400" rtl="0" eaLnBrk="1" latinLnBrk="0" hangingPunct="1"/>
-                      <a:r>
-                        <a:rPr lang="en-US" sz="1800" b="0" kern="1200" baseline="0" dirty="0">
-                          <a:solidFill>
-                            <a:srgbClr val="FF0000"/>
-                          </a:solidFill>
-                          <a:latin typeface="+mn-lt"/>
-                          <a:ea typeface="+mn-ea"/>
-                          <a:cs typeface="+mn-cs"/>
-                        </a:rPr>
-                        <a:t>27.61</a:t>
-                      </a:r>
+                      <a:endParaRPr lang="en-US" sz="1800" b="0" kern="1200" baseline="0" dirty="0">
+                        <a:solidFill>
+                          <a:srgbClr val="FF0000"/>
+                        </a:solidFill>
+                        <a:latin typeface="+mn-lt"/>
+                        <a:ea typeface="+mn-ea"/>
+                        <a:cs typeface="+mn-cs"/>
+                      </a:endParaRPr>
                     </a:p>
                   </a:txBody>
                   <a:tcPr anchor="ctr"/>
@@ -43527,34 +42965,13 @@
                       <a:r>
                         <a:rPr lang="en-US" sz="1800" b="0" kern="1200" baseline="0">
                           <a:solidFill>
-                            <a:schemeClr val="dk1"/>
-                          </a:solidFill>
-                          <a:latin typeface="+mn-lt"/>
-                          <a:ea typeface="+mn-ea"/>
-                          <a:cs typeface="+mn-cs"/>
-                        </a:rPr>
-                        <a:t>0.812 </a:t>
-                      </a:r>
-                    </a:p>
-                  </a:txBody>
-                  <a:tcPr anchor="ctr"/>
-                </a:tc>
-                <a:tc>
-                  <a:txBody>
-                    <a:bodyPr/>
-                    <a:lstStyle/>
-                    <a:p>
-                      <a:pPr marL="0" algn="ctr" defTabSz="914400" rtl="0" eaLnBrk="1" latinLnBrk="0" hangingPunct="1"/>
-                      <a:r>
-                        <a:rPr lang="en-US" sz="1800" b="0" kern="1200" baseline="0" dirty="0">
-                          <a:solidFill>
                             <a:srgbClr val="FF0000"/>
                           </a:solidFill>
                           <a:latin typeface="+mn-lt"/>
                           <a:ea typeface="+mn-ea"/>
                           <a:cs typeface="+mn-cs"/>
                         </a:rPr>
-                        <a:t>0.817</a:t>
+                        <a:t>0.811 </a:t>
                       </a:r>
                     </a:p>
                   </a:txBody>
@@ -43679,7 +43096,7 @@
                     <a:p>
                       <a:pPr marL="0" algn="ctr" defTabSz="914400" rtl="0" eaLnBrk="1" latinLnBrk="0" hangingPunct="1"/>
                       <a:r>
-                        <a:rPr lang="en-US" sz="1800" b="0" kern="1200" baseline="0" dirty="0">
+                        <a:rPr lang="en-US" sz="1800" b="0" kern="1200" baseline="0">
                           <a:solidFill>
                             <a:srgbClr val="FF0000"/>
                           </a:solidFill>
@@ -43687,29 +43104,16 @@
                           <a:ea typeface="+mn-ea"/>
                           <a:cs typeface="+mn-cs"/>
                         </a:rPr>
-                        <a:t>0.198 </a:t>
+                        <a:t>0.168 </a:t>
                       </a:r>
-                    </a:p>
-                  </a:txBody>
-                  <a:tcPr anchor="ctr"/>
-                </a:tc>
-                <a:tc>
-                  <a:txBody>
-                    <a:bodyPr/>
-                    <a:lstStyle/>
-                    <a:p>
-                      <a:pPr marL="0" algn="ctr" defTabSz="914400" rtl="0" eaLnBrk="1" latinLnBrk="0" hangingPunct="1"/>
-                      <a:r>
-                        <a:rPr lang="en-US" sz="1800" b="0" kern="1200" baseline="0">
-                          <a:solidFill>
-                            <a:schemeClr val="dk1"/>
-                          </a:solidFill>
-                          <a:latin typeface="+mn-lt"/>
-                          <a:ea typeface="+mn-ea"/>
-                          <a:cs typeface="+mn-cs"/>
-                        </a:rPr>
-                        <a:t>0.200</a:t>
-                      </a:r>
+                      <a:endParaRPr lang="en-US" sz="1800" b="0" kern="1200" baseline="0" dirty="0">
+                        <a:solidFill>
+                          <a:srgbClr val="FF0000"/>
+                        </a:solidFill>
+                        <a:latin typeface="+mn-lt"/>
+                        <a:ea typeface="+mn-ea"/>
+                        <a:cs typeface="+mn-cs"/>
+                      </a:endParaRPr>
                     </a:p>
                   </a:txBody>
                   <a:tcPr anchor="ctr"/>
@@ -43833,7 +43237,7 @@
                     <a:p>
                       <a:pPr marL="0" algn="ctr" defTabSz="914400" rtl="0" eaLnBrk="1" latinLnBrk="0" hangingPunct="1"/>
                       <a:r>
-                        <a:rPr lang="en-US" sz="1800" b="0" kern="1200" baseline="0" dirty="0">
+                        <a:rPr lang="en-US" sz="1800" b="0" kern="1200" baseline="0">
                           <a:solidFill>
                             <a:srgbClr val="FF0000"/>
                           </a:solidFill>
@@ -43841,29 +43245,16 @@
                           <a:ea typeface="+mn-ea"/>
                           <a:cs typeface="+mn-cs"/>
                         </a:rPr>
-                        <a:t>32.02 </a:t>
+                        <a:t>31.79 </a:t>
                       </a:r>
-                    </a:p>
-                  </a:txBody>
-                  <a:tcPr anchor="ctr"/>
-                </a:tc>
-                <a:tc>
-                  <a:txBody>
-                    <a:bodyPr/>
-                    <a:lstStyle/>
-                    <a:p>
-                      <a:pPr marL="0" algn="ctr" defTabSz="914400" rtl="0" eaLnBrk="1" latinLnBrk="0" hangingPunct="1"/>
-                      <a:r>
-                        <a:rPr lang="en-US" sz="1800" b="0" kern="1200" baseline="0" dirty="0">
-                          <a:solidFill>
-                            <a:schemeClr val="dk1"/>
-                          </a:solidFill>
-                          <a:latin typeface="+mn-lt"/>
-                          <a:ea typeface="+mn-ea"/>
-                          <a:cs typeface="+mn-cs"/>
-                        </a:rPr>
-                        <a:t>32.00</a:t>
-                      </a:r>
+                      <a:endParaRPr lang="en-US" sz="1800" b="0" kern="1200" baseline="0" dirty="0">
+                        <a:solidFill>
+                          <a:srgbClr val="FF0000"/>
+                        </a:solidFill>
+                        <a:latin typeface="+mn-lt"/>
+                        <a:ea typeface="+mn-ea"/>
+                        <a:cs typeface="+mn-cs"/>
+                      </a:endParaRPr>
                     </a:p>
                   </a:txBody>
                   <a:tcPr anchor="ctr"/>
@@ -43987,28 +43378,7 @@
                     <a:p>
                       <a:pPr marL="0" algn="ctr" defTabSz="914400" rtl="0" eaLnBrk="1" latinLnBrk="0" hangingPunct="1"/>
                       <a:r>
-                        <a:rPr lang="en-US" sz="1800" b="0" kern="1200" baseline="0" dirty="0">
-                          <a:solidFill>
-                            <a:schemeClr val="dk1"/>
-                          </a:solidFill>
-                          <a:latin typeface="+mn-lt"/>
-                          <a:ea typeface="+mn-ea"/>
-                          <a:cs typeface="+mn-cs"/>
-                        </a:rPr>
-                        <a:t>0.870 </a:t>
-                      </a:r>
-                    </a:p>
-                  </a:txBody>
-                  <a:tcPr anchor="ctr"/>
-                </a:tc>
-                <a:tc>
-                  <a:txBody>
-                    <a:bodyPr/>
-                    <a:lstStyle/>
-                    <a:p>
-                      <a:pPr marL="0" algn="ctr" defTabSz="914400" rtl="0" eaLnBrk="1" latinLnBrk="0" hangingPunct="1"/>
-                      <a:r>
-                        <a:rPr lang="en-US" sz="1800" b="0" kern="1200" baseline="0" dirty="0">
+                        <a:rPr lang="en-US" sz="1800" b="0" kern="1200" baseline="0">
                           <a:solidFill>
                             <a:srgbClr val="FF0000"/>
                           </a:solidFill>
@@ -44016,8 +43386,16 @@
                           <a:ea typeface="+mn-ea"/>
                           <a:cs typeface="+mn-cs"/>
                         </a:rPr>
-                        <a:t>0.871</a:t>
+                        <a:t>0.866 </a:t>
                       </a:r>
+                      <a:endParaRPr lang="en-US" sz="1800" b="0" kern="1200" baseline="0" dirty="0">
+                        <a:solidFill>
+                          <a:srgbClr val="FF0000"/>
+                        </a:solidFill>
+                        <a:latin typeface="+mn-lt"/>
+                        <a:ea typeface="+mn-ea"/>
+                        <a:cs typeface="+mn-cs"/>
+                      </a:endParaRPr>
                     </a:p>
                   </a:txBody>
                   <a:tcPr anchor="ctr"/>
@@ -44152,7 +43530,7 @@
                     <a:p>
                       <a:pPr marL="0" algn="ctr" defTabSz="914400" rtl="0" eaLnBrk="1" latinLnBrk="0" hangingPunct="1"/>
                       <a:r>
-                        <a:rPr lang="en-US" sz="1800" b="0" kern="1200" baseline="0" dirty="0">
+                        <a:rPr lang="en-US" sz="1800" b="0" kern="1200" baseline="0">
                           <a:solidFill>
                             <a:srgbClr val="FF0000"/>
                           </a:solidFill>
@@ -44160,29 +43538,16 @@
                           <a:ea typeface="+mn-ea"/>
                           <a:cs typeface="+mn-cs"/>
                         </a:rPr>
-                        <a:t>0.209 </a:t>
+                        <a:t>0.188 </a:t>
                       </a:r>
-                    </a:p>
-                  </a:txBody>
-                  <a:tcPr anchor="ctr"/>
-                </a:tc>
-                <a:tc>
-                  <a:txBody>
-                    <a:bodyPr/>
-                    <a:lstStyle/>
-                    <a:p>
-                      <a:pPr marL="0" algn="ctr" defTabSz="914400" rtl="0" eaLnBrk="1" latinLnBrk="0" hangingPunct="1"/>
-                      <a:r>
-                        <a:rPr lang="en-US" sz="1800" b="0" kern="1200" baseline="0" dirty="0">
-                          <a:solidFill>
-                            <a:schemeClr val="dk1"/>
-                          </a:solidFill>
-                          <a:latin typeface="+mn-lt"/>
-                          <a:ea typeface="+mn-ea"/>
-                          <a:cs typeface="+mn-cs"/>
-                        </a:rPr>
-                        <a:t>0.211</a:t>
-                      </a:r>
+                      <a:endParaRPr lang="en-US" sz="1800" b="0" kern="1200" baseline="0" dirty="0">
+                        <a:solidFill>
+                          <a:srgbClr val="FF0000"/>
+                        </a:solidFill>
+                        <a:latin typeface="+mn-lt"/>
+                        <a:ea typeface="+mn-ea"/>
+                        <a:cs typeface="+mn-cs"/>
+                      </a:endParaRPr>
                     </a:p>
                   </a:txBody>
                   <a:tcPr anchor="ctr"/>
@@ -44211,7 +43576,7 @@
         </p:nvSpPr>
         <p:spPr>
           <a:xfrm>
-            <a:off x="5201438" y="4406233"/>
+            <a:off x="5201438" y="4097107"/>
             <a:ext cx="1789120" cy="369332"/>
           </a:xfrm>
           <a:prstGeom prst="rect">
@@ -44236,6 +43601,526 @@
           </a:p>
         </p:txBody>
       </p:sp>
+      <p:graphicFrame>
+        <p:nvGraphicFramePr>
+          <p:cNvPr id="9" name="表格 9">
+            <a:extLst>
+              <a:ext uri="{FF2B5EF4-FFF2-40B4-BE49-F238E27FC236}">
+                <a16:creationId xmlns:a16="http://schemas.microsoft.com/office/drawing/2014/main" id="{4AD257B0-A8C7-03A4-1CDB-984B9A680404}"/>
+              </a:ext>
+            </a:extLst>
+          </p:cNvPr>
+          <p:cNvGraphicFramePr>
+            <a:graphicFrameLocks noGrp="1"/>
+          </p:cNvGraphicFramePr>
+          <p:nvPr>
+            <p:extLst>
+              <p:ext uri="{D42A27DB-BD31-4B8C-83A1-F6EECF244321}">
+                <p14:modId xmlns:p14="http://schemas.microsoft.com/office/powerpoint/2010/main" val="1774543600"/>
+              </p:ext>
+            </p:extLst>
+          </p:nvPr>
+        </p:nvGraphicFramePr>
+        <p:xfrm>
+          <a:off x="2024306" y="4538868"/>
+          <a:ext cx="8346192" cy="1645920"/>
+        </p:xfrm>
+        <a:graphic>
+          <a:graphicData uri="http://schemas.openxmlformats.org/drawingml/2006/table">
+            <a:tbl>
+              <a:tblPr firstRow="1" bandRow="1">
+                <a:tableStyleId>{5C22544A-7EE6-4342-B048-85BDC9FD1C3A}</a:tableStyleId>
+              </a:tblPr>
+              <a:tblGrid>
+                <a:gridCol w="1192313">
+                  <a:extLst>
+                    <a:ext uri="{9D8B030D-6E8A-4147-A177-3AD203B41FA5}">
+                      <a16:colId xmlns:a16="http://schemas.microsoft.com/office/drawing/2014/main" val="1151877380"/>
+                    </a:ext>
+                  </a:extLst>
+                </a:gridCol>
+                <a:gridCol w="1578650">
+                  <a:extLst>
+                    <a:ext uri="{9D8B030D-6E8A-4147-A177-3AD203B41FA5}">
+                      <a16:colId xmlns:a16="http://schemas.microsoft.com/office/drawing/2014/main" val="1592165879"/>
+                    </a:ext>
+                  </a:extLst>
+                </a:gridCol>
+                <a:gridCol w="1132544">
+                  <a:extLst>
+                    <a:ext uri="{9D8B030D-6E8A-4147-A177-3AD203B41FA5}">
+                      <a16:colId xmlns:a16="http://schemas.microsoft.com/office/drawing/2014/main" val="3234025950"/>
+                    </a:ext>
+                  </a:extLst>
+                </a:gridCol>
+                <a:gridCol w="865746">
+                  <a:extLst>
+                    <a:ext uri="{9D8B030D-6E8A-4147-A177-3AD203B41FA5}">
+                      <a16:colId xmlns:a16="http://schemas.microsoft.com/office/drawing/2014/main" val="1782617715"/>
+                    </a:ext>
+                  </a:extLst>
+                </a:gridCol>
+                <a:gridCol w="1192313">
+                  <a:extLst>
+                    <a:ext uri="{9D8B030D-6E8A-4147-A177-3AD203B41FA5}">
+                      <a16:colId xmlns:a16="http://schemas.microsoft.com/office/drawing/2014/main" val="868109551"/>
+                    </a:ext>
+                  </a:extLst>
+                </a:gridCol>
+                <a:gridCol w="847043">
+                  <a:extLst>
+                    <a:ext uri="{9D8B030D-6E8A-4147-A177-3AD203B41FA5}">
+                      <a16:colId xmlns:a16="http://schemas.microsoft.com/office/drawing/2014/main" val="655125830"/>
+                    </a:ext>
+                  </a:extLst>
+                </a:gridCol>
+                <a:gridCol w="1537583">
+                  <a:extLst>
+                    <a:ext uri="{9D8B030D-6E8A-4147-A177-3AD203B41FA5}">
+                      <a16:colId xmlns:a16="http://schemas.microsoft.com/office/drawing/2014/main" val="1704815477"/>
+                    </a:ext>
+                  </a:extLst>
+                </a:gridCol>
+              </a:tblGrid>
+              <a:tr h="297083">
+                <a:tc rowSpan="2">
+                  <a:txBody>
+                    <a:bodyPr/>
+                    <a:lstStyle/>
+                    <a:p>
+                      <a:pPr algn="ctr"/>
+                      <a:r>
+                        <a:rPr lang="en-US" altLang="zh-CN"/>
+                        <a:t>Device</a:t>
+                      </a:r>
+                      <a:endParaRPr lang="zh-CN" altLang="en-US"/>
+                    </a:p>
+                  </a:txBody>
+                  <a:tcPr anchor="ctr"/>
+                </a:tc>
+                <a:tc gridSpan="2">
+                  <a:txBody>
+                    <a:bodyPr/>
+                    <a:lstStyle/>
+                    <a:p>
+                      <a:pPr algn="ctr"/>
+                      <a:r>
+                        <a:rPr lang="en-US" altLang="zh-CN"/>
+                        <a:t>Configuration Parameters</a:t>
+                      </a:r>
+                      <a:endParaRPr lang="zh-CN" altLang="en-US"/>
+                    </a:p>
+                  </a:txBody>
+                  <a:tcPr anchor="ctr"/>
+                </a:tc>
+                <a:tc hMerge="1">
+                  <a:txBody>
+                    <a:bodyPr/>
+                    <a:lstStyle/>
+                    <a:p>
+                      <a:endParaRPr lang="zh-CN" altLang="en-US"/>
+                    </a:p>
+                  </a:txBody>
+                  <a:tcPr/>
+                </a:tc>
+                <a:tc gridSpan="4">
+                  <a:txBody>
+                    <a:bodyPr/>
+                    <a:lstStyle/>
+                    <a:p>
+                      <a:pPr algn="ctr"/>
+                      <a:r>
+                        <a:rPr lang="en-US" altLang="zh-CN"/>
+                        <a:t>Resource Utilization</a:t>
+                      </a:r>
+                      <a:endParaRPr lang="zh-CN" altLang="en-US"/>
+                    </a:p>
+                  </a:txBody>
+                  <a:tcPr anchor="ctr"/>
+                </a:tc>
+                <a:tc hMerge="1">
+                  <a:txBody>
+                    <a:bodyPr/>
+                    <a:lstStyle/>
+                    <a:p>
+                      <a:endParaRPr lang="zh-CN" altLang="en-US"/>
+                    </a:p>
+                  </a:txBody>
+                  <a:tcPr/>
+                </a:tc>
+                <a:tc hMerge="1">
+                  <a:txBody>
+                    <a:bodyPr/>
+                    <a:lstStyle/>
+                    <a:p>
+                      <a:endParaRPr lang="zh-CN" altLang="en-US"/>
+                    </a:p>
+                  </a:txBody>
+                  <a:tcPr/>
+                </a:tc>
+                <a:tc hMerge="1">
+                  <a:txBody>
+                    <a:bodyPr/>
+                    <a:lstStyle/>
+                    <a:p>
+                      <a:endParaRPr lang="zh-CN" altLang="en-US"/>
+                    </a:p>
+                  </a:txBody>
+                  <a:tcPr/>
+                </a:tc>
+                <a:extLst>
+                  <a:ext uri="{0D108BD9-81ED-4DB2-BD59-A6C34878D82A}">
+                    <a16:rowId xmlns:a16="http://schemas.microsoft.com/office/drawing/2014/main" val="2637942058"/>
+                  </a:ext>
+                </a:extLst>
+              </a:tr>
+              <a:tr h="0">
+                <a:tc vMerge="1">
+                  <a:txBody>
+                    <a:bodyPr/>
+                    <a:lstStyle/>
+                    <a:p>
+                      <a:endParaRPr lang="zh-CN" altLang="en-US"/>
+                    </a:p>
+                  </a:txBody>
+                  <a:tcPr/>
+                </a:tc>
+                <a:tc>
+                  <a:txBody>
+                    <a:bodyPr/>
+                    <a:lstStyle/>
+                    <a:p>
+                      <a:pPr algn="ctr"/>
+                      <a:r>
+                        <a:rPr lang="en-US" altLang="zh-CN"/>
+                        <a:t>Resolution </a:t>
+                      </a:r>
+                    </a:p>
+                    <a:p>
+                      <a:pPr algn="ctr"/>
+                      <a:r>
+                        <a:rPr lang="en-US" altLang="zh-CN"/>
+                        <a:t>PPC</a:t>
+                      </a:r>
+                      <a:endParaRPr lang="zh-CN" altLang="en-US"/>
+                    </a:p>
+                  </a:txBody>
+                  <a:tcPr anchor="ctr"/>
+                </a:tc>
+                <a:tc>
+                  <a:txBody>
+                    <a:bodyPr/>
+                    <a:lstStyle/>
+                    <a:p>
+                      <a:pPr algn="ctr"/>
+                      <a:r>
+                        <a:rPr lang="en-US" altLang="zh-CN"/>
+                        <a:t>fCLK</a:t>
+                      </a:r>
+                    </a:p>
+                    <a:p>
+                      <a:pPr algn="ctr"/>
+                      <a:r>
+                        <a:rPr lang="en-US" altLang="zh-CN"/>
+                        <a:t>(MHz)</a:t>
+                      </a:r>
+                      <a:endParaRPr lang="zh-CN" altLang="en-US"/>
+                    </a:p>
+                  </a:txBody>
+                  <a:tcPr anchor="ctr"/>
+                </a:tc>
+                <a:tc>
+                  <a:txBody>
+                    <a:bodyPr/>
+                    <a:lstStyle/>
+                    <a:p>
+                      <a:pPr algn="ctr"/>
+                      <a:r>
+                        <a:rPr lang="en-US" altLang="zh-CN"/>
+                        <a:t>LUTs</a:t>
+                      </a:r>
+                      <a:endParaRPr lang="zh-CN" altLang="en-US"/>
+                    </a:p>
+                  </a:txBody>
+                  <a:tcPr anchor="ctr"/>
+                </a:tc>
+                <a:tc>
+                  <a:txBody>
+                    <a:bodyPr/>
+                    <a:lstStyle/>
+                    <a:p>
+                      <a:pPr algn="ctr"/>
+                      <a:r>
+                        <a:rPr lang="en-US" altLang="zh-CN"/>
+                        <a:t>FFs</a:t>
+                      </a:r>
+                      <a:endParaRPr lang="zh-CN" altLang="en-US"/>
+                    </a:p>
+                  </a:txBody>
+                  <a:tcPr anchor="ctr"/>
+                </a:tc>
+                <a:tc>
+                  <a:txBody>
+                    <a:bodyPr/>
+                    <a:lstStyle/>
+                    <a:p>
+                      <a:pPr algn="ctr"/>
+                      <a:r>
+                        <a:rPr lang="en-US" altLang="zh-CN"/>
+                        <a:t>DSPs</a:t>
+                      </a:r>
+                      <a:endParaRPr lang="zh-CN" altLang="en-US"/>
+                    </a:p>
+                  </a:txBody>
+                  <a:tcPr anchor="ctr"/>
+                </a:tc>
+                <a:tc>
+                  <a:txBody>
+                    <a:bodyPr/>
+                    <a:lstStyle/>
+                    <a:p>
+                      <a:pPr algn="ctr"/>
+                      <a:r>
+                        <a:rPr lang="en-US" altLang="zh-CN"/>
+                        <a:t>BRAMs</a:t>
+                      </a:r>
+                      <a:endParaRPr lang="zh-CN" altLang="en-US"/>
+                    </a:p>
+                  </a:txBody>
+                  <a:tcPr anchor="ctr"/>
+                </a:tc>
+                <a:extLst>
+                  <a:ext uri="{0D108BD9-81ED-4DB2-BD59-A6C34878D82A}">
+                    <a16:rowId xmlns:a16="http://schemas.microsoft.com/office/drawing/2014/main" val="2655523072"/>
+                  </a:ext>
+                </a:extLst>
+              </a:tr>
+              <a:tr h="370840">
+                <a:tc>
+                  <a:txBody>
+                    <a:bodyPr/>
+                    <a:lstStyle/>
+                    <a:p>
+                      <a:pPr marL="0" algn="ctr" defTabSz="914400" rtl="0" eaLnBrk="1" latinLnBrk="0" hangingPunct="1"/>
+                      <a:r>
+                        <a:rPr lang="en-US" sz="1800" kern="1200">
+                          <a:solidFill>
+                            <a:schemeClr val="dk1"/>
+                          </a:solidFill>
+                          <a:latin typeface="+mn-lt"/>
+                          <a:ea typeface="+mn-ea"/>
+                          <a:cs typeface="+mn-cs"/>
+                        </a:rPr>
+                        <a:t>XCZU15EG</a:t>
+                      </a:r>
+                    </a:p>
+                  </a:txBody>
+                  <a:tcPr anchor="ctr"/>
+                </a:tc>
+                <a:tc>
+                  <a:txBody>
+                    <a:bodyPr/>
+                    <a:lstStyle/>
+                    <a:p>
+                      <a:pPr marL="0" algn="ctr" defTabSz="914400" rtl="0" eaLnBrk="1" latinLnBrk="0" hangingPunct="1"/>
+                      <a:r>
+                        <a:rPr lang="en-US" sz="1800" kern="1200">
+                          <a:solidFill>
+                            <a:schemeClr val="dk1"/>
+                          </a:solidFill>
+                          <a:latin typeface="+mn-lt"/>
+                          <a:ea typeface="+mn-ea"/>
+                          <a:cs typeface="+mn-cs"/>
+                        </a:rPr>
+                        <a:t>3840 x 2160</a:t>
+                      </a:r>
+                    </a:p>
+                    <a:p>
+                      <a:pPr marL="0" algn="ctr" defTabSz="914400" rtl="0" eaLnBrk="1" latinLnBrk="0" hangingPunct="1"/>
+                      <a:r>
+                        <a:rPr lang="en-US" sz="1800" kern="1200">
+                          <a:solidFill>
+                            <a:schemeClr val="dk1"/>
+                          </a:solidFill>
+                          <a:latin typeface="+mn-lt"/>
+                          <a:ea typeface="+mn-ea"/>
+                          <a:cs typeface="+mn-cs"/>
+                        </a:rPr>
+                        <a:t>4</a:t>
+                      </a:r>
+                    </a:p>
+                  </a:txBody>
+                  <a:tcPr anchor="ctr"/>
+                </a:tc>
+                <a:tc>
+                  <a:txBody>
+                    <a:bodyPr/>
+                    <a:lstStyle/>
+                    <a:p>
+                      <a:pPr marL="0" algn="ctr" defTabSz="914400" rtl="0" eaLnBrk="1" latinLnBrk="0" hangingPunct="1"/>
+                      <a:r>
+                        <a:rPr lang="en-US" altLang="zh-CN" sz="1800" kern="1200">
+                          <a:solidFill>
+                            <a:schemeClr val="dk1"/>
+                          </a:solidFill>
+                          <a:latin typeface="+mn-lt"/>
+                          <a:ea typeface="+mn-ea"/>
+                          <a:cs typeface="+mn-cs"/>
+                        </a:rPr>
+                        <a:t>150</a:t>
+                      </a:r>
+                      <a:endParaRPr lang="zh-CN" altLang="en-US" sz="1800" kern="1200">
+                        <a:solidFill>
+                          <a:schemeClr val="dk1"/>
+                        </a:solidFill>
+                        <a:latin typeface="+mn-lt"/>
+                        <a:ea typeface="+mn-ea"/>
+                        <a:cs typeface="+mn-cs"/>
+                      </a:endParaRPr>
+                    </a:p>
+                  </a:txBody>
+                  <a:tcPr anchor="ctr"/>
+                </a:tc>
+                <a:tc>
+                  <a:txBody>
+                    <a:bodyPr/>
+                    <a:lstStyle/>
+                    <a:p>
+                      <a:pPr marL="0" algn="ctr" defTabSz="914400" rtl="0" eaLnBrk="1" latinLnBrk="0" hangingPunct="1"/>
+                      <a:r>
+                        <a:rPr lang="en-US" altLang="zh-CN" sz="1800" kern="1200">
+                          <a:solidFill>
+                            <a:schemeClr val="dk1"/>
+                          </a:solidFill>
+                          <a:latin typeface="+mn-lt"/>
+                          <a:ea typeface="+mn-ea"/>
+                          <a:cs typeface="+mn-cs"/>
+                        </a:rPr>
+                        <a:t>5739</a:t>
+                      </a:r>
+                      <a:endParaRPr lang="zh-CN" altLang="en-US" sz="1800" kern="1200">
+                        <a:solidFill>
+                          <a:schemeClr val="dk1"/>
+                        </a:solidFill>
+                        <a:latin typeface="+mn-lt"/>
+                        <a:ea typeface="+mn-ea"/>
+                        <a:cs typeface="+mn-cs"/>
+                      </a:endParaRPr>
+                    </a:p>
+                  </a:txBody>
+                  <a:tcPr anchor="ctr"/>
+                </a:tc>
+                <a:tc>
+                  <a:txBody>
+                    <a:bodyPr/>
+                    <a:lstStyle/>
+                    <a:p>
+                      <a:pPr marL="0" algn="ctr" defTabSz="914400" rtl="0" eaLnBrk="1" latinLnBrk="0" hangingPunct="1"/>
+                      <a:r>
+                        <a:rPr lang="en-US" altLang="zh-CN" sz="1800" kern="1200">
+                          <a:solidFill>
+                            <a:schemeClr val="dk1"/>
+                          </a:solidFill>
+                          <a:latin typeface="+mn-lt"/>
+                          <a:ea typeface="+mn-ea"/>
+                          <a:cs typeface="+mn-cs"/>
+                        </a:rPr>
+                        <a:t>5732</a:t>
+                      </a:r>
+                      <a:endParaRPr lang="zh-CN" altLang="en-US" sz="1800" kern="1200">
+                        <a:solidFill>
+                          <a:schemeClr val="dk1"/>
+                        </a:solidFill>
+                        <a:latin typeface="+mn-lt"/>
+                        <a:ea typeface="+mn-ea"/>
+                        <a:cs typeface="+mn-cs"/>
+                      </a:endParaRPr>
+                    </a:p>
+                  </a:txBody>
+                  <a:tcPr anchor="ctr"/>
+                </a:tc>
+                <a:tc>
+                  <a:txBody>
+                    <a:bodyPr/>
+                    <a:lstStyle/>
+                    <a:p>
+                      <a:pPr marL="0" algn="ctr" defTabSz="914400" rtl="0" eaLnBrk="1" latinLnBrk="0" hangingPunct="1"/>
+                      <a:r>
+                        <a:rPr lang="en-US" altLang="zh-CN" sz="1800" kern="1200">
+                          <a:solidFill>
+                            <a:schemeClr val="dk1"/>
+                          </a:solidFill>
+                          <a:latin typeface="+mn-lt"/>
+                          <a:ea typeface="+mn-ea"/>
+                          <a:cs typeface="+mn-cs"/>
+                        </a:rPr>
+                        <a:t>440</a:t>
+                      </a:r>
+                      <a:endParaRPr lang="zh-CN" altLang="en-US" sz="1800" kern="1200">
+                        <a:solidFill>
+                          <a:schemeClr val="dk1"/>
+                        </a:solidFill>
+                        <a:latin typeface="+mn-lt"/>
+                        <a:ea typeface="+mn-ea"/>
+                        <a:cs typeface="+mn-cs"/>
+                      </a:endParaRPr>
+                    </a:p>
+                  </a:txBody>
+                  <a:tcPr anchor="ctr"/>
+                </a:tc>
+                <a:tc>
+                  <a:txBody>
+                    <a:bodyPr/>
+                    <a:lstStyle/>
+                    <a:p>
+                      <a:pPr marL="0" algn="ctr" defTabSz="914400" rtl="0" eaLnBrk="1" latinLnBrk="0" hangingPunct="1"/>
+                      <a:r>
+                        <a:rPr lang="en-US" altLang="zh-CN" sz="1800" kern="1200">
+                          <a:solidFill>
+                            <a:schemeClr val="dk1"/>
+                          </a:solidFill>
+                          <a:latin typeface="+mn-lt"/>
+                          <a:ea typeface="+mn-ea"/>
+                          <a:cs typeface="+mn-cs"/>
+                        </a:rPr>
+                        <a:t>40.5(BRAM)</a:t>
+                      </a:r>
+                    </a:p>
+                    <a:p>
+                      <a:pPr marL="0" algn="ctr" defTabSz="914400" rtl="0" eaLnBrk="1" latinLnBrk="0" hangingPunct="1"/>
+                      <a:r>
+                        <a:rPr lang="en-US" altLang="zh-CN" sz="1800" kern="1200">
+                          <a:solidFill>
+                            <a:schemeClr val="dk1"/>
+                          </a:solidFill>
+                          <a:latin typeface="+mn-lt"/>
+                          <a:ea typeface="+mn-ea"/>
+                          <a:cs typeface="+mn-cs"/>
+                        </a:rPr>
+                        <a:t>25(URAM)</a:t>
+                      </a:r>
+                      <a:endParaRPr lang="zh-CN" altLang="en-US" sz="1800" kern="1200">
+                        <a:solidFill>
+                          <a:schemeClr val="dk1"/>
+                        </a:solidFill>
+                        <a:latin typeface="+mn-lt"/>
+                        <a:ea typeface="+mn-ea"/>
+                        <a:cs typeface="+mn-cs"/>
+                      </a:endParaRPr>
+                    </a:p>
+                  </a:txBody>
+                  <a:tcPr anchor="ctr"/>
+                </a:tc>
+                <a:extLst>
+                  <a:ext uri="{0D108BD9-81ED-4DB2-BD59-A6C34878D82A}">
+                    <a16:rowId xmlns:a16="http://schemas.microsoft.com/office/drawing/2014/main" val="1478872073"/>
+                  </a:ext>
+                </a:extLst>
+              </a:tr>
+            </a:tbl>
+          </a:graphicData>
+        </a:graphic>
+      </p:graphicFrame>
     </p:spTree>
     <p:extLst>
       <p:ext uri="{BB962C8B-B14F-4D97-AF65-F5344CB8AC3E}">

</xml_diff>